<commit_message>
Aggiunte persistenza, schermate e considerazioni finali
</commit_message>
<xml_diff>
--- a/ioVoto.pptx
+++ b/ioVoto.pptx
@@ -5,10 +5,10 @@
     <p:sldMasterId id="2147483648" r:id="rId1"/>
   </p:sldMasterIdLst>
   <p:notesMasterIdLst>
-    <p:notesMasterId r:id="rId9"/>
+    <p:notesMasterId r:id="rId13"/>
   </p:notesMasterIdLst>
   <p:handoutMasterIdLst>
-    <p:handoutMasterId r:id="rId10"/>
+    <p:handoutMasterId r:id="rId14"/>
   </p:handoutMasterIdLst>
   <p:sldIdLst>
     <p:sldId id="262" r:id="rId2"/>
@@ -16,8 +16,12 @@
     <p:sldId id="259" r:id="rId4"/>
     <p:sldId id="260" r:id="rId5"/>
     <p:sldId id="261" r:id="rId6"/>
-    <p:sldId id="263" r:id="rId7"/>
-    <p:sldId id="264" r:id="rId8"/>
+    <p:sldId id="267" r:id="rId7"/>
+    <p:sldId id="263" r:id="rId8"/>
+    <p:sldId id="264" r:id="rId9"/>
+    <p:sldId id="265" r:id="rId10"/>
+    <p:sldId id="266" r:id="rId11"/>
+    <p:sldId id="268" r:id="rId12"/>
   </p:sldIdLst>
   <p:sldSz cx="12192000" cy="6858000"/>
   <p:notesSz cx="6858000" cy="9144000"/>
@@ -1146,7 +1150,7 @@
           <a:r>
             <a:rPr lang="it-IT" dirty="0" err="1">
               <a:solidFill>
-                <a:srgbClr val="ED7D31"/>
+                <a:srgbClr val="3BA8F2"/>
               </a:solidFill>
             </a:rPr>
             <a:t>VisualStudio</a:t>
@@ -1154,12 +1158,16 @@
           <a:r>
             <a:rPr lang="it-IT" dirty="0">
               <a:solidFill>
-                <a:srgbClr val="ED7D31"/>
+                <a:srgbClr val="3BA8F2"/>
               </a:solidFill>
             </a:rPr>
             <a:t> Code </a:t>
           </a:r>
-          <a:endParaRPr lang="en-US" dirty="0"/>
+          <a:endParaRPr lang="en-US" dirty="0">
+            <a:solidFill>
+              <a:srgbClr val="3BA8F2"/>
+            </a:solidFill>
+          </a:endParaRPr>
         </a:p>
       </dgm:t>
     </dgm:pt>
@@ -1293,7 +1301,7 @@
           <a:r>
             <a:rPr lang="it-IT" dirty="0">
               <a:solidFill>
-                <a:srgbClr val="7030A0"/>
+                <a:schemeClr val="bg1"/>
               </a:solidFill>
             </a:rPr>
             <a:t>Html, </a:t>
@@ -1301,19 +1309,16 @@
           <a:r>
             <a:rPr lang="it-IT" dirty="0" err="1">
               <a:solidFill>
-                <a:srgbClr val="7030A0"/>
+                <a:schemeClr val="bg1"/>
               </a:solidFill>
             </a:rPr>
             <a:t>Css</a:t>
           </a:r>
-          <a:r>
-            <a:rPr lang="it-IT" dirty="0">
-              <a:solidFill>
-                <a:srgbClr val="7030A0"/>
-              </a:solidFill>
-            </a:rPr>
-            <a:t>, JavaScript</a:t>
-          </a:r>
+          <a:endParaRPr lang="it-IT" dirty="0">
+            <a:solidFill>
+              <a:schemeClr val="bg1"/>
+            </a:solidFill>
+          </a:endParaRPr>
         </a:p>
       </dgm:t>
     </dgm:pt>
@@ -1329,6 +1334,61 @@
       </dgm:t>
     </dgm:pt>
     <dgm:pt modelId="{1211D37E-EC49-4B9C-9BAA-426E8291384A}" type="sibTrans" cxnId="{B3F048F1-3B80-4798-AD22-C03455E1F152}">
+      <dgm:prSet/>
+      <dgm:spPr/>
+      <dgm:t>
+        <a:bodyPr/>
+        <a:lstStyle/>
+        <a:p>
+          <a:pPr>
+            <a:lnSpc>
+              <a:spcPct val="100000"/>
+            </a:lnSpc>
+          </a:pPr>
+          <a:endParaRPr lang="en-GB"/>
+        </a:p>
+      </dgm:t>
+    </dgm:pt>
+    <dgm:pt modelId="{6ECCEEF4-0978-4AEF-B333-AC2C80B48618}">
+      <dgm:prSet/>
+      <dgm:spPr/>
+      <dgm:t>
+        <a:bodyPr/>
+        <a:lstStyle/>
+        <a:p>
+          <a:pPr>
+            <a:lnSpc>
+              <a:spcPct val="100000"/>
+            </a:lnSpc>
+          </a:pPr>
+          <a:r>
+            <a:rPr lang="it-IT" dirty="0" err="1">
+              <a:solidFill>
+                <a:srgbClr val="E23237"/>
+              </a:solidFill>
+            </a:rPr>
+            <a:t>Angular</a:t>
+          </a:r>
+          <a:endParaRPr lang="en-GB" dirty="0">
+            <a:solidFill>
+              <a:srgbClr val="E23237"/>
+            </a:solidFill>
+          </a:endParaRPr>
+        </a:p>
+      </dgm:t>
+    </dgm:pt>
+    <dgm:pt modelId="{48AA51EC-4C0E-44F1-9966-BF5021CF02BF}" type="parTrans" cxnId="{53FF073B-9C92-448E-94CB-F8C048BCF695}">
+      <dgm:prSet/>
+      <dgm:spPr/>
+      <dgm:t>
+        <a:bodyPr/>
+        <a:lstStyle/>
+        <a:p>
+          <a:endParaRPr lang="en-GB"/>
+        </a:p>
+      </dgm:t>
+    </dgm:pt>
+    <dgm:pt modelId="{546E6F92-2441-4B47-982F-F3824C8AB005}" type="sibTrans" cxnId="{53FF073B-9C92-448E-94CB-F8C048BCF695}">
       <dgm:prSet/>
       <dgm:spPr/>
       <dgm:t>
@@ -1362,7 +1422,7 @@
       <dgm:spPr/>
     </dgm:pt>
     <dgm:pt modelId="{32AEB77B-CE3D-4252-854E-DB7E26D006BB}" type="pres">
-      <dgm:prSet presAssocID="{8DFF89B5-D8BC-4014-A119-EDF881DBB6B7}" presName="iconBgRect" presStyleLbl="bgShp" presStyleIdx="0" presStyleCnt="4"/>
+      <dgm:prSet presAssocID="{8DFF89B5-D8BC-4014-A119-EDF881DBB6B7}" presName="iconBgRect" presStyleLbl="bgShp" presStyleIdx="0" presStyleCnt="5"/>
       <dgm:spPr>
         <a:solidFill>
           <a:schemeClr val="bg1"/>
@@ -1370,7 +1430,7 @@
       </dgm:spPr>
     </dgm:pt>
     <dgm:pt modelId="{B573E0A5-790A-4A1A-BB25-AB1CAD1EF6DC}" type="pres">
-      <dgm:prSet presAssocID="{8DFF89B5-D8BC-4014-A119-EDF881DBB6B7}" presName="iconRect" presStyleLbl="node1" presStyleIdx="0" presStyleCnt="4"/>
+      <dgm:prSet presAssocID="{8DFF89B5-D8BC-4014-A119-EDF881DBB6B7}" presName="iconRect" presStyleLbl="node1" presStyleIdx="0" presStyleCnt="5"/>
       <dgm:spPr>
         <a:blipFill>
           <a:blip xmlns:r="http://schemas.openxmlformats.org/officeDocument/2006/relationships" r:embed="rId1">
@@ -1395,7 +1455,7 @@
       <dgm:spPr/>
     </dgm:pt>
     <dgm:pt modelId="{F36141C2-74AC-419D-B6F2-8268CB221162}" type="pres">
-      <dgm:prSet presAssocID="{8DFF89B5-D8BC-4014-A119-EDF881DBB6B7}" presName="textRect" presStyleLbl="revTx" presStyleIdx="0" presStyleCnt="4">
+      <dgm:prSet presAssocID="{8DFF89B5-D8BC-4014-A119-EDF881DBB6B7}" presName="textRect" presStyleLbl="revTx" presStyleIdx="0" presStyleCnt="5">
         <dgm:presLayoutVars>
           <dgm:chMax val="1"/>
           <dgm:chPref val="1"/>
@@ -1412,7 +1472,7 @@
       <dgm:spPr/>
     </dgm:pt>
     <dgm:pt modelId="{5720C254-FEBE-4527-AF58-A09FDB454C70}" type="pres">
-      <dgm:prSet presAssocID="{DE69BD19-04E8-4F59-A011-62E2B150ECCB}" presName="iconBgRect" presStyleLbl="bgShp" presStyleIdx="1" presStyleCnt="4"/>
+      <dgm:prSet presAssocID="{DE69BD19-04E8-4F59-A011-62E2B150ECCB}" presName="iconBgRect" presStyleLbl="bgShp" presStyleIdx="1" presStyleCnt="5"/>
       <dgm:spPr>
         <a:solidFill>
           <a:srgbClr val="ED7D31"/>
@@ -1420,7 +1480,7 @@
       </dgm:spPr>
     </dgm:pt>
     <dgm:pt modelId="{D454F6E3-69BD-481E-9AA8-9A9D6F77CBDE}" type="pres">
-      <dgm:prSet presAssocID="{DE69BD19-04E8-4F59-A011-62E2B150ECCB}" presName="iconRect" presStyleLbl="node1" presStyleIdx="1" presStyleCnt="4"/>
+      <dgm:prSet presAssocID="{DE69BD19-04E8-4F59-A011-62E2B150ECCB}" presName="iconRect" presStyleLbl="node1" presStyleIdx="1" presStyleCnt="5"/>
       <dgm:spPr>
         <a:blipFill rotWithShape="1">
           <a:blip xmlns:r="http://schemas.openxmlformats.org/officeDocument/2006/relationships" r:embed="rId2">
@@ -1450,7 +1510,7 @@
       <dgm:spPr/>
     </dgm:pt>
     <dgm:pt modelId="{592A0547-0022-4C98-9DF3-CD746DA4270B}" type="pres">
-      <dgm:prSet presAssocID="{DE69BD19-04E8-4F59-A011-62E2B150ECCB}" presName="textRect" presStyleLbl="revTx" presStyleIdx="1" presStyleCnt="4">
+      <dgm:prSet presAssocID="{DE69BD19-04E8-4F59-A011-62E2B150ECCB}" presName="textRect" presStyleLbl="revTx" presStyleIdx="1" presStyleCnt="5">
         <dgm:presLayoutVars>
           <dgm:chMax val="1"/>
           <dgm:chPref val="1"/>
@@ -1467,7 +1527,7 @@
       <dgm:spPr/>
     </dgm:pt>
     <dgm:pt modelId="{63F68EA7-2F44-4F46-A057-AF4E60A46C49}" type="pres">
-      <dgm:prSet presAssocID="{B00DA5AB-3D8B-4B29-A92A-07A9DF1F5C69}" presName="iconBgRect" presStyleLbl="bgShp" presStyleIdx="2" presStyleCnt="4"/>
+      <dgm:prSet presAssocID="{B00DA5AB-3D8B-4B29-A92A-07A9DF1F5C69}" presName="iconBgRect" presStyleLbl="bgShp" presStyleIdx="2" presStyleCnt="5"/>
       <dgm:spPr>
         <a:solidFill>
           <a:schemeClr val="tx1"/>
@@ -1475,7 +1535,7 @@
       </dgm:spPr>
     </dgm:pt>
     <dgm:pt modelId="{47036EFF-7447-41FF-96D9-D4118C7D8B66}" type="pres">
-      <dgm:prSet presAssocID="{B00DA5AB-3D8B-4B29-A92A-07A9DF1F5C69}" presName="iconRect" presStyleLbl="node1" presStyleIdx="2" presStyleCnt="4"/>
+      <dgm:prSet presAssocID="{B00DA5AB-3D8B-4B29-A92A-07A9DF1F5C69}" presName="iconRect" presStyleLbl="node1" presStyleIdx="2" presStyleCnt="5"/>
       <dgm:spPr>
         <a:blipFill>
           <a:blip xmlns:r="http://schemas.openxmlformats.org/officeDocument/2006/relationships" r:embed="rId4">
@@ -1500,7 +1560,7 @@
       <dgm:spPr/>
     </dgm:pt>
     <dgm:pt modelId="{57AE38EE-C7D5-4F12-A845-B3C68A2CD36B}" type="pres">
-      <dgm:prSet presAssocID="{B00DA5AB-3D8B-4B29-A92A-07A9DF1F5C69}" presName="textRect" presStyleLbl="revTx" presStyleIdx="2" presStyleCnt="4">
+      <dgm:prSet presAssocID="{B00DA5AB-3D8B-4B29-A92A-07A9DF1F5C69}" presName="textRect" presStyleLbl="revTx" presStyleIdx="2" presStyleCnt="5">
         <dgm:presLayoutVars>
           <dgm:chMax val="1"/>
           <dgm:chPref val="1"/>
@@ -1517,7 +1577,7 @@
       <dgm:spPr/>
     </dgm:pt>
     <dgm:pt modelId="{A17F5C9F-93DB-4ED5-BB4F-D31EB156A8D1}" type="pres">
-      <dgm:prSet presAssocID="{0C6703EC-F402-461E-8374-19BE57CA7120}" presName="iconBgRect" presStyleLbl="bgShp" presStyleIdx="3" presStyleCnt="4"/>
+      <dgm:prSet presAssocID="{0C6703EC-F402-461E-8374-19BE57CA7120}" presName="iconBgRect" presStyleLbl="bgShp" presStyleIdx="3" presStyleCnt="5"/>
       <dgm:spPr>
         <a:solidFill>
           <a:srgbClr val="7030A0"/>
@@ -1525,7 +1585,7 @@
       </dgm:spPr>
     </dgm:pt>
     <dgm:pt modelId="{F60CEBCF-C589-4083-91BD-805B905FD68E}" type="pres">
-      <dgm:prSet presAssocID="{0C6703EC-F402-461E-8374-19BE57CA7120}" presName="iconRect" presStyleLbl="node1" presStyleIdx="3" presStyleCnt="4"/>
+      <dgm:prSet presAssocID="{0C6703EC-F402-461E-8374-19BE57CA7120}" presName="iconRect" presStyleLbl="node1" presStyleIdx="3" presStyleCnt="5"/>
       <dgm:spPr>
         <a:blipFill>
           <a:blip xmlns:r="http://schemas.openxmlformats.org/officeDocument/2006/relationships" r:embed="rId6">
@@ -1543,7 +1603,7 @@
       </dgm:spPr>
       <dgm:extLst>
         <a:ext uri="{E40237B7-FDA0-4F09-8148-C483321AD2D9}">
-          <dgm14:cNvPr xmlns:dgm14="http://schemas.microsoft.com/office/drawing/2010/diagram" id="0" name="" descr="Web design contorno"/>
+          <dgm14:cNvPr xmlns:dgm14="http://schemas.microsoft.com/office/drawing/2010/diagram" id="0" name="" descr="Web design con riempimento a tinta unita"/>
         </a:ext>
       </dgm:extLst>
     </dgm:pt>
@@ -1552,7 +1612,54 @@
       <dgm:spPr/>
     </dgm:pt>
     <dgm:pt modelId="{48065E13-9000-43EB-9521-58099CBA42E6}" type="pres">
-      <dgm:prSet presAssocID="{0C6703EC-F402-461E-8374-19BE57CA7120}" presName="textRect" presStyleLbl="revTx" presStyleIdx="3" presStyleCnt="4">
+      <dgm:prSet presAssocID="{0C6703EC-F402-461E-8374-19BE57CA7120}" presName="textRect" presStyleLbl="revTx" presStyleIdx="3" presStyleCnt="5">
+        <dgm:presLayoutVars>
+          <dgm:chMax val="1"/>
+          <dgm:chPref val="1"/>
+        </dgm:presLayoutVars>
+      </dgm:prSet>
+      <dgm:spPr/>
+    </dgm:pt>
+    <dgm:pt modelId="{75412DA9-E65B-4B91-BA25-E7CE0811B655}" type="pres">
+      <dgm:prSet presAssocID="{1211D37E-EC49-4B9C-9BAA-426E8291384A}" presName="sibTrans" presStyleLbl="sibTrans2D1" presStyleIdx="0" presStyleCnt="0"/>
+      <dgm:spPr/>
+    </dgm:pt>
+    <dgm:pt modelId="{26F0B7FC-6B2F-4691-A2B6-7E7C93157045}" type="pres">
+      <dgm:prSet presAssocID="{6ECCEEF4-0978-4AEF-B333-AC2C80B48618}" presName="compNode" presStyleCnt="0"/>
+      <dgm:spPr/>
+    </dgm:pt>
+    <dgm:pt modelId="{17148300-6A56-4D1C-BC79-A25BA7DD393E}" type="pres">
+      <dgm:prSet presAssocID="{6ECCEEF4-0978-4AEF-B333-AC2C80B48618}" presName="iconBgRect" presStyleLbl="bgShp" presStyleIdx="4" presStyleCnt="5"/>
+      <dgm:spPr>
+        <a:solidFill>
+          <a:srgbClr val="002060"/>
+        </a:solidFill>
+      </dgm:spPr>
+    </dgm:pt>
+    <dgm:pt modelId="{A5C71D99-EFD1-4CA5-99AD-FE3B3922B325}" type="pres">
+      <dgm:prSet presAssocID="{6ECCEEF4-0978-4AEF-B333-AC2C80B48618}" presName="iconRect" presStyleLbl="node1" presStyleIdx="4" presStyleCnt="5"/>
+      <dgm:spPr>
+        <a:blipFill>
+          <a:blip xmlns:r="http://schemas.openxmlformats.org/officeDocument/2006/relationships" r:embed="rId8">
+            <a:extLst>
+              <a:ext uri="{837473B0-CC2E-450A-ABE3-18F120FF3D39}">
+                <a1611:picAttrSrcUrl xmlns:a1611="http://schemas.microsoft.com/office/drawing/2016/11/main" r:id="rId9"/>
+              </a:ext>
+            </a:extLst>
+          </a:blip>
+          <a:srcRect/>
+          <a:stretch>
+            <a:fillRect/>
+          </a:stretch>
+        </a:blipFill>
+      </dgm:spPr>
+    </dgm:pt>
+    <dgm:pt modelId="{9DD64ACA-C16A-4686-9646-7F03F097F72A}" type="pres">
+      <dgm:prSet presAssocID="{6ECCEEF4-0978-4AEF-B333-AC2C80B48618}" presName="spaceRect" presStyleCnt="0"/>
+      <dgm:spPr/>
+    </dgm:pt>
+    <dgm:pt modelId="{8F9C8D91-A2F5-42AD-8C0B-ED2BE4CAA54D}" type="pres">
+      <dgm:prSet presAssocID="{6ECCEEF4-0978-4AEF-B333-AC2C80B48618}" presName="textRect" presStyleLbl="revTx" presStyleIdx="4" presStyleCnt="5">
         <dgm:presLayoutVars>
           <dgm:chMax val="1"/>
           <dgm:chPref val="1"/>
@@ -1563,11 +1670,14 @@
   </dgm:ptLst>
   <dgm:cxnLst>
     <dgm:cxn modelId="{62464800-6B2B-4AB9-931F-5E8ECDF75228}" srcId="{84748320-660B-41FD-81C9-CA02624A0F4C}" destId="{B00DA5AB-3D8B-4B29-A92A-07A9DF1F5C69}" srcOrd="2" destOrd="0" parTransId="{CBFE1D96-7C5F-4E89-B97A-4B3DEE855D74}" sibTransId="{CFCFFCAE-6F1F-46FD-B01F-24D1D3EB5CFB}"/>
+    <dgm:cxn modelId="{1362A300-D358-4E44-BACB-71B573FAB497}" type="presOf" srcId="{6ECCEEF4-0978-4AEF-B333-AC2C80B48618}" destId="{8F9C8D91-A2F5-42AD-8C0B-ED2BE4CAA54D}" srcOrd="0" destOrd="0" presId="urn:microsoft.com/office/officeart/2018/2/layout/IconCircleList"/>
     <dgm:cxn modelId="{185F3501-96AC-438F-BFA2-E08931D9F897}" type="presOf" srcId="{0801084D-275A-4D13-9E00-C8B2FA5A734F}" destId="{60BD4632-D224-49DE-B12E-DCC031C616CC}" srcOrd="0" destOrd="0" presId="urn:microsoft.com/office/officeart/2018/2/layout/IconCircleList"/>
     <dgm:cxn modelId="{64D72903-25CF-48A6-BA9B-10DEE34DD1A2}" type="presOf" srcId="{B00DA5AB-3D8B-4B29-A92A-07A9DF1F5C69}" destId="{57AE38EE-C7D5-4F12-A845-B3C68A2CD36B}" srcOrd="0" destOrd="0" presId="urn:microsoft.com/office/officeart/2018/2/layout/IconCircleList"/>
     <dgm:cxn modelId="{4C087111-8A02-4729-8F7D-1135C622D7AD}" srcId="{0C6703EC-F402-461E-8374-19BE57CA7120}" destId="{0F8096CA-46DE-4965-BEFC-8FD6195ED933}" srcOrd="0" destOrd="0" parTransId="{B1131143-6005-41C9-AE44-9BE42938E55C}" sibTransId="{E1F2661D-7F3B-48E2-AD9B-FC45A53CC62E}"/>
     <dgm:cxn modelId="{3805B019-E8AC-4F5F-BCD5-0E292D71C879}" type="presOf" srcId="{8DFF89B5-D8BC-4014-A119-EDF881DBB6B7}" destId="{F36141C2-74AC-419D-B6F2-8268CB221162}" srcOrd="0" destOrd="0" presId="urn:microsoft.com/office/officeart/2018/2/layout/IconCircleList"/>
+    <dgm:cxn modelId="{D69F3725-1871-42F8-BC14-5819033E5756}" type="presOf" srcId="{1211D37E-EC49-4B9C-9BAA-426E8291384A}" destId="{75412DA9-E65B-4B91-BA25-E7CE0811B655}" srcOrd="0" destOrd="0" presId="urn:microsoft.com/office/officeart/2018/2/layout/IconCircleList"/>
     <dgm:cxn modelId="{9751B939-58E7-463E-B4F4-ACB4A7517A31}" srcId="{84748320-660B-41FD-81C9-CA02624A0F4C}" destId="{8DFF89B5-D8BC-4014-A119-EDF881DBB6B7}" srcOrd="0" destOrd="0" parTransId="{C284868C-975B-4C2F-B5F5-9ADEB4CDB3DE}" sibTransId="{0801084D-275A-4D13-9E00-C8B2FA5A734F}"/>
+    <dgm:cxn modelId="{53FF073B-9C92-448E-94CB-F8C048BCF695}" srcId="{84748320-660B-41FD-81C9-CA02624A0F4C}" destId="{6ECCEEF4-0978-4AEF-B333-AC2C80B48618}" srcOrd="4" destOrd="0" parTransId="{48AA51EC-4C0E-44F1-9966-BF5021CF02BF}" sibTransId="{546E6F92-2441-4B47-982F-F3824C8AB005}"/>
     <dgm:cxn modelId="{BAD4AD45-5A1C-40C0-9DBF-63A8DD6B812F}" type="presOf" srcId="{2F8CE607-D0A6-4AE5-B79F-8A37093C0B8F}" destId="{5AC6B1B3-C656-4F16-9CD7-0C3E93F520C3}" srcOrd="0" destOrd="0" presId="urn:microsoft.com/office/officeart/2018/2/layout/IconCircleList"/>
     <dgm:cxn modelId="{673AE569-0365-4E4C-9F19-9CEFC554EE56}" type="presOf" srcId="{CFCFFCAE-6F1F-46FD-B01F-24D1D3EB5CFB}" destId="{791A9F34-B3C5-4BE9-80FD-00C5AAF6E582}" srcOrd="0" destOrd="0" presId="urn:microsoft.com/office/officeart/2018/2/layout/IconCircleList"/>
     <dgm:cxn modelId="{9F48A3B2-F9F6-4595-B5F3-D72FB56513A3}" type="presOf" srcId="{0C6703EC-F402-461E-8374-19BE57CA7120}" destId="{48065E13-9000-43EB-9521-58099CBA42E6}" srcOrd="0" destOrd="0" presId="urn:microsoft.com/office/officeart/2018/2/layout/IconCircleList"/>
@@ -1599,6 +1709,12 @@
     <dgm:cxn modelId="{FBD12B12-8747-4A85-8D02-9D6295FD22F1}" type="presParOf" srcId="{D20758CF-092E-47EF-9911-29BF27667AB9}" destId="{F60CEBCF-C589-4083-91BD-805B905FD68E}" srcOrd="1" destOrd="0" presId="urn:microsoft.com/office/officeart/2018/2/layout/IconCircleList"/>
     <dgm:cxn modelId="{3A919B45-DD20-4634-BD9E-C7E5BDA4467A}" type="presParOf" srcId="{D20758CF-092E-47EF-9911-29BF27667AB9}" destId="{555D43B0-F7A1-4844-B9C7-06802FA24A02}" srcOrd="2" destOrd="0" presId="urn:microsoft.com/office/officeart/2018/2/layout/IconCircleList"/>
     <dgm:cxn modelId="{7AA138F8-A89E-4397-9E92-C66A83130E02}" type="presParOf" srcId="{D20758CF-092E-47EF-9911-29BF27667AB9}" destId="{48065E13-9000-43EB-9521-58099CBA42E6}" srcOrd="3" destOrd="0" presId="urn:microsoft.com/office/officeart/2018/2/layout/IconCircleList"/>
+    <dgm:cxn modelId="{CE15BC7A-D840-48FE-9417-9D04C9BDF103}" type="presParOf" srcId="{3953D132-8E5B-4487-BD3B-6C5207452D84}" destId="{75412DA9-E65B-4B91-BA25-E7CE0811B655}" srcOrd="7" destOrd="0" presId="urn:microsoft.com/office/officeart/2018/2/layout/IconCircleList"/>
+    <dgm:cxn modelId="{A7692A3C-45F8-4785-827F-6654F61B2424}" type="presParOf" srcId="{3953D132-8E5B-4487-BD3B-6C5207452D84}" destId="{26F0B7FC-6B2F-4691-A2B6-7E7C93157045}" srcOrd="8" destOrd="0" presId="urn:microsoft.com/office/officeart/2018/2/layout/IconCircleList"/>
+    <dgm:cxn modelId="{C565AE81-B963-47D0-80CD-30A7A9E711C0}" type="presParOf" srcId="{26F0B7FC-6B2F-4691-A2B6-7E7C93157045}" destId="{17148300-6A56-4D1C-BC79-A25BA7DD393E}" srcOrd="0" destOrd="0" presId="urn:microsoft.com/office/officeart/2018/2/layout/IconCircleList"/>
+    <dgm:cxn modelId="{6F017F8A-39B0-4F67-A673-68CB2CE86A25}" type="presParOf" srcId="{26F0B7FC-6B2F-4691-A2B6-7E7C93157045}" destId="{A5C71D99-EFD1-4CA5-99AD-FE3B3922B325}" srcOrd="1" destOrd="0" presId="urn:microsoft.com/office/officeart/2018/2/layout/IconCircleList"/>
+    <dgm:cxn modelId="{374C6437-410F-47FB-B25B-794D129B744F}" type="presParOf" srcId="{26F0B7FC-6B2F-4691-A2B6-7E7C93157045}" destId="{9DD64ACA-C16A-4686-9646-7F03F097F72A}" srcOrd="2" destOrd="0" presId="urn:microsoft.com/office/officeart/2018/2/layout/IconCircleList"/>
+    <dgm:cxn modelId="{F52F7BBF-4C84-4037-8F93-25316E1307A6}" type="presParOf" srcId="{26F0B7FC-6B2F-4691-A2B6-7E7C93157045}" destId="{8F9C8D91-A2F5-42AD-8C0B-ED2BE4CAA54D}" srcOrd="3" destOrd="0" presId="urn:microsoft.com/office/officeart/2018/2/layout/IconCircleList"/>
   </dgm:cxnLst>
   <dgm:bg/>
   <dgm:whole/>
@@ -1625,8 +1741,8 @@
       </dsp:nvSpPr>
       <dsp:spPr>
         <a:xfrm>
-          <a:off x="212335" y="302868"/>
-          <a:ext cx="1335915" cy="1335915"/>
+          <a:off x="82613" y="741537"/>
+          <a:ext cx="897246" cy="897246"/>
         </a:xfrm>
         <a:prstGeom prst="ellipse">
           <a:avLst/>
@@ -1659,8 +1775,8 @@
       </dsp:nvSpPr>
       <dsp:spPr>
         <a:xfrm>
-          <a:off x="492877" y="583410"/>
-          <a:ext cx="774830" cy="774830"/>
+          <a:off x="271034" y="929959"/>
+          <a:ext cx="520402" cy="520402"/>
         </a:xfrm>
         <a:prstGeom prst="rect">
           <a:avLst/>
@@ -1707,8 +1823,8 @@
       </dsp:nvSpPr>
       <dsp:spPr>
         <a:xfrm>
-          <a:off x="1834517" y="302868"/>
-          <a:ext cx="3148942" cy="1335915"/>
+          <a:off x="1172126" y="741537"/>
+          <a:ext cx="2114937" cy="897246"/>
         </a:xfrm>
         <a:prstGeom prst="rect">
           <a:avLst/>
@@ -1760,8 +1876,8 @@
         </a:p>
       </dsp:txBody>
       <dsp:txXfrm>
-        <a:off x="1834517" y="302868"/>
-        <a:ext cx="3148942" cy="1335915"/>
+        <a:off x="1172126" y="741537"/>
+        <a:ext cx="2114937" cy="897246"/>
       </dsp:txXfrm>
     </dsp:sp>
     <dsp:sp modelId="{5720C254-FEBE-4527-AF58-A09FDB454C70}">
@@ -1771,8 +1887,8 @@
       </dsp:nvSpPr>
       <dsp:spPr>
         <a:xfrm>
-          <a:off x="5532139" y="302868"/>
-          <a:ext cx="1335915" cy="1335915"/>
+          <a:off x="3655575" y="741537"/>
+          <a:ext cx="897246" cy="897246"/>
         </a:xfrm>
         <a:prstGeom prst="ellipse">
           <a:avLst/>
@@ -1805,8 +1921,8 @@
       </dsp:nvSpPr>
       <dsp:spPr>
         <a:xfrm>
-          <a:off x="5812681" y="583410"/>
-          <a:ext cx="774830" cy="774830"/>
+          <a:off x="3843996" y="929959"/>
+          <a:ext cx="520402" cy="520402"/>
         </a:xfrm>
         <a:prstGeom prst="rect">
           <a:avLst/>
@@ -1853,8 +1969,8 @@
       </dsp:nvSpPr>
       <dsp:spPr>
         <a:xfrm>
-          <a:off x="7154322" y="302868"/>
-          <a:ext cx="3148942" cy="1335915"/>
+          <a:off x="4745088" y="741537"/>
+          <a:ext cx="2114937" cy="897246"/>
         </a:xfrm>
         <a:prstGeom prst="rect">
           <a:avLst/>
@@ -1898,7 +2014,7 @@
           <a:r>
             <a:rPr lang="it-IT" sz="2400" kern="1200" dirty="0" err="1">
               <a:solidFill>
-                <a:srgbClr val="ED7D31"/>
+                <a:srgbClr val="3BA8F2"/>
               </a:solidFill>
             </a:rPr>
             <a:t>VisualStudio</a:t>
@@ -1906,17 +2022,21 @@
           <a:r>
             <a:rPr lang="it-IT" sz="2400" kern="1200" dirty="0">
               <a:solidFill>
-                <a:srgbClr val="ED7D31"/>
+                <a:srgbClr val="3BA8F2"/>
               </a:solidFill>
             </a:rPr>
             <a:t> Code </a:t>
           </a:r>
-          <a:endParaRPr lang="en-US" sz="2400" kern="1200" dirty="0"/>
+          <a:endParaRPr lang="en-US" sz="2400" kern="1200" dirty="0">
+            <a:solidFill>
+              <a:srgbClr val="3BA8F2"/>
+            </a:solidFill>
+          </a:endParaRPr>
         </a:p>
       </dsp:txBody>
       <dsp:txXfrm>
-        <a:off x="7154322" y="302868"/>
-        <a:ext cx="3148942" cy="1335915"/>
+        <a:off x="4745088" y="741537"/>
+        <a:ext cx="2114937" cy="897246"/>
       </dsp:txXfrm>
     </dsp:sp>
     <dsp:sp modelId="{63F68EA7-2F44-4F46-A057-AF4E60A46C49}">
@@ -1926,8 +2046,8 @@
       </dsp:nvSpPr>
       <dsp:spPr>
         <a:xfrm>
-          <a:off x="212335" y="2310092"/>
-          <a:ext cx="1335915" cy="1335915"/>
+          <a:off x="7228536" y="741537"/>
+          <a:ext cx="897246" cy="897246"/>
         </a:xfrm>
         <a:prstGeom prst="ellipse">
           <a:avLst/>
@@ -1960,8 +2080,8 @@
       </dsp:nvSpPr>
       <dsp:spPr>
         <a:xfrm>
-          <a:off x="492877" y="2590634"/>
-          <a:ext cx="774830" cy="774830"/>
+          <a:off x="7416958" y="929959"/>
+          <a:ext cx="520402" cy="520402"/>
         </a:xfrm>
         <a:prstGeom prst="rect">
           <a:avLst/>
@@ -2008,8 +2128,8 @@
       </dsp:nvSpPr>
       <dsp:spPr>
         <a:xfrm>
-          <a:off x="1834517" y="2310092"/>
-          <a:ext cx="3148942" cy="1335915"/>
+          <a:off x="8318049" y="741537"/>
+          <a:ext cx="2114937" cy="897246"/>
         </a:xfrm>
         <a:prstGeom prst="rect">
           <a:avLst/>
@@ -2066,8 +2186,8 @@
         </a:p>
       </dsp:txBody>
       <dsp:txXfrm>
-        <a:off x="1834517" y="2310092"/>
-        <a:ext cx="3148942" cy="1335915"/>
+        <a:off x="8318049" y="741537"/>
+        <a:ext cx="2114937" cy="897246"/>
       </dsp:txXfrm>
     </dsp:sp>
     <dsp:sp modelId="{A17F5C9F-93DB-4ED5-BB4F-D31EB156A8D1}">
@@ -2077,8 +2197,8 @@
       </dsp:nvSpPr>
       <dsp:spPr>
         <a:xfrm>
-          <a:off x="5532139" y="2310092"/>
-          <a:ext cx="1335915" cy="1335915"/>
+          <a:off x="82613" y="2310092"/>
+          <a:ext cx="897246" cy="897246"/>
         </a:xfrm>
         <a:prstGeom prst="ellipse">
           <a:avLst/>
@@ -2111,8 +2231,8 @@
       </dsp:nvSpPr>
       <dsp:spPr>
         <a:xfrm>
-          <a:off x="5812681" y="2590634"/>
-          <a:ext cx="774830" cy="774830"/>
+          <a:off x="271034" y="2498514"/>
+          <a:ext cx="520402" cy="520402"/>
         </a:xfrm>
         <a:prstGeom prst="rect">
           <a:avLst/>
@@ -2167,8 +2287,8 @@
       </dsp:nvSpPr>
       <dsp:spPr>
         <a:xfrm>
-          <a:off x="7154322" y="2310092"/>
-          <a:ext cx="3148942" cy="1335915"/>
+          <a:off x="1172126" y="2310092"/>
+          <a:ext cx="2114937" cy="897246"/>
         </a:xfrm>
         <a:prstGeom prst="rect">
           <a:avLst/>
@@ -2212,7 +2332,7 @@
           <a:r>
             <a:rPr lang="it-IT" sz="2400" kern="1200" dirty="0">
               <a:solidFill>
-                <a:srgbClr val="7030A0"/>
+                <a:schemeClr val="bg1"/>
               </a:solidFill>
             </a:rPr>
             <a:t>Html, </a:t>
@@ -2220,24 +2340,180 @@
           <a:r>
             <a:rPr lang="it-IT" sz="2400" kern="1200" dirty="0" err="1">
               <a:solidFill>
-                <a:srgbClr val="7030A0"/>
+                <a:schemeClr val="bg1"/>
               </a:solidFill>
             </a:rPr>
             <a:t>Css</a:t>
           </a:r>
-          <a:r>
-            <a:rPr lang="it-IT" sz="2400" kern="1200" dirty="0">
-              <a:solidFill>
-                <a:srgbClr val="7030A0"/>
-              </a:solidFill>
-            </a:rPr>
-            <a:t>, JavaScript</a:t>
-          </a:r>
+          <a:endParaRPr lang="it-IT" sz="2400" kern="1200" dirty="0">
+            <a:solidFill>
+              <a:schemeClr val="bg1"/>
+            </a:solidFill>
+          </a:endParaRPr>
         </a:p>
       </dsp:txBody>
       <dsp:txXfrm>
-        <a:off x="7154322" y="2310092"/>
-        <a:ext cx="3148942" cy="1335915"/>
+        <a:off x="1172126" y="2310092"/>
+        <a:ext cx="2114937" cy="897246"/>
+      </dsp:txXfrm>
+    </dsp:sp>
+    <dsp:sp modelId="{17148300-6A56-4D1C-BC79-A25BA7DD393E}">
+      <dsp:nvSpPr>
+        <dsp:cNvPr id="0" name=""/>
+        <dsp:cNvSpPr/>
+      </dsp:nvSpPr>
+      <dsp:spPr>
+        <a:xfrm>
+          <a:off x="3655575" y="2310092"/>
+          <a:ext cx="897246" cy="897246"/>
+        </a:xfrm>
+        <a:prstGeom prst="ellipse">
+          <a:avLst/>
+        </a:prstGeom>
+        <a:solidFill>
+          <a:srgbClr val="002060"/>
+        </a:solidFill>
+        <a:ln>
+          <a:noFill/>
+        </a:ln>
+        <a:effectLst/>
+      </dsp:spPr>
+      <dsp:style>
+        <a:lnRef idx="0">
+          <a:scrgbClr r="0" g="0" b="0"/>
+        </a:lnRef>
+        <a:fillRef idx="1">
+          <a:scrgbClr r="0" g="0" b="0"/>
+        </a:fillRef>
+        <a:effectRef idx="0">
+          <a:scrgbClr r="0" g="0" b="0"/>
+        </a:effectRef>
+        <a:fontRef idx="minor"/>
+      </dsp:style>
+    </dsp:sp>
+    <dsp:sp modelId="{A5C71D99-EFD1-4CA5-99AD-FE3B3922B325}">
+      <dsp:nvSpPr>
+        <dsp:cNvPr id="0" name=""/>
+        <dsp:cNvSpPr/>
+      </dsp:nvSpPr>
+      <dsp:spPr>
+        <a:xfrm>
+          <a:off x="3843996" y="2498514"/>
+          <a:ext cx="520402" cy="520402"/>
+        </a:xfrm>
+        <a:prstGeom prst="rect">
+          <a:avLst/>
+        </a:prstGeom>
+        <a:blipFill>
+          <a:blip xmlns:r="http://schemas.openxmlformats.org/officeDocument/2006/relationships" r:embed="rId8">
+            <a:extLst>
+              <a:ext uri="{837473B0-CC2E-450A-ABE3-18F120FF3D39}">
+                <a1611:picAttrSrcUrl xmlns:a1611="http://schemas.microsoft.com/office/drawing/2016/11/main" r:id="rId9"/>
+              </a:ext>
+            </a:extLst>
+          </a:blip>
+          <a:srcRect/>
+          <a:stretch>
+            <a:fillRect/>
+          </a:stretch>
+        </a:blipFill>
+        <a:ln w="12700" cap="flat" cmpd="sng" algn="ctr">
+          <a:solidFill>
+            <a:schemeClr val="lt1">
+              <a:alpha val="0"/>
+              <a:hueOff val="0"/>
+              <a:satOff val="0"/>
+              <a:lumOff val="0"/>
+              <a:alphaOff val="0"/>
+            </a:schemeClr>
+          </a:solidFill>
+          <a:prstDash val="solid"/>
+          <a:miter lim="800000"/>
+        </a:ln>
+        <a:effectLst/>
+      </dsp:spPr>
+      <dsp:style>
+        <a:lnRef idx="2">
+          <a:scrgbClr r="0" g="0" b="0"/>
+        </a:lnRef>
+        <a:fillRef idx="1">
+          <a:scrgbClr r="0" g="0" b="0"/>
+        </a:fillRef>
+        <a:effectRef idx="0">
+          <a:scrgbClr r="0" g="0" b="0"/>
+        </a:effectRef>
+        <a:fontRef idx="minor">
+          <a:schemeClr val="lt1"/>
+        </a:fontRef>
+      </dsp:style>
+    </dsp:sp>
+    <dsp:sp modelId="{8F9C8D91-A2F5-42AD-8C0B-ED2BE4CAA54D}">
+      <dsp:nvSpPr>
+        <dsp:cNvPr id="0" name=""/>
+        <dsp:cNvSpPr/>
+      </dsp:nvSpPr>
+      <dsp:spPr>
+        <a:xfrm>
+          <a:off x="4745088" y="2310092"/>
+          <a:ext cx="2114937" cy="897246"/>
+        </a:xfrm>
+        <a:prstGeom prst="rect">
+          <a:avLst/>
+        </a:prstGeom>
+        <a:noFill/>
+        <a:ln>
+          <a:noFill/>
+        </a:ln>
+        <a:effectLst/>
+      </dsp:spPr>
+      <dsp:style>
+        <a:lnRef idx="0">
+          <a:scrgbClr r="0" g="0" b="0"/>
+        </a:lnRef>
+        <a:fillRef idx="0">
+          <a:scrgbClr r="0" g="0" b="0"/>
+        </a:fillRef>
+        <a:effectRef idx="0">
+          <a:scrgbClr r="0" g="0" b="0"/>
+        </a:effectRef>
+        <a:fontRef idx="minor"/>
+      </dsp:style>
+      <dsp:txBody>
+        <a:bodyPr spcFirstLastPara="0" vert="horz" wrap="square" lIns="0" tIns="0" rIns="0" bIns="0" numCol="1" spcCol="1270" anchor="ctr" anchorCtr="0">
+          <a:noAutofit/>
+        </a:bodyPr>
+        <a:lstStyle/>
+        <a:p>
+          <a:pPr marL="0" lvl="0" indent="0" algn="l" defTabSz="1066800">
+            <a:lnSpc>
+              <a:spcPct val="100000"/>
+            </a:lnSpc>
+            <a:spcBef>
+              <a:spcPct val="0"/>
+            </a:spcBef>
+            <a:spcAft>
+              <a:spcPct val="35000"/>
+            </a:spcAft>
+            <a:buNone/>
+          </a:pPr>
+          <a:r>
+            <a:rPr lang="it-IT" sz="2400" kern="1200" dirty="0" err="1">
+              <a:solidFill>
+                <a:srgbClr val="E23237"/>
+              </a:solidFill>
+            </a:rPr>
+            <a:t>Angular</a:t>
+          </a:r>
+          <a:endParaRPr lang="en-GB" sz="2400" kern="1200" dirty="0">
+            <a:solidFill>
+              <a:srgbClr val="E23237"/>
+            </a:solidFill>
+          </a:endParaRPr>
+        </a:p>
+      </dsp:txBody>
+      <dsp:txXfrm>
+        <a:off x="4745088" y="2310092"/>
+        <a:ext cx="2114937" cy="897246"/>
       </dsp:txXfrm>
     </dsp:sp>
   </dsp:spTree>
@@ -3584,7 +3860,7 @@
           <a:p>
             <a:fld id="{B05E37D8-F87F-43EF-A613-4C53E71D9A8B}" type="datetimeFigureOut">
               <a:rPr lang="en-GB" smtClean="0"/>
-              <a:t>17/07/2022</a:t>
+              <a:t>18/07/2022</a:t>
             </a:fld>
             <a:endParaRPr lang="en-GB"/>
           </a:p>
@@ -3761,7 +4037,7 @@
           <a:p>
             <a:fld id="{E5A627A4-93D9-4CD1-9442-4D43CEEDFFCA}" type="datetimeFigureOut">
               <a:rPr lang="en-GB" smtClean="0"/>
-              <a:t>17/07/2022</a:t>
+              <a:t>18/07/2022</a:t>
             </a:fld>
             <a:endParaRPr lang="en-GB"/>
           </a:p>
@@ -4184,7 +4460,7 @@
           <a:p>
             <a:fld id="{590D5618-0DC6-4B63-9A13-5E1E28C6EDDB}" type="datetimeFigureOut">
               <a:rPr lang="en-GB" smtClean="0"/>
-              <a:t>17/07/2022</a:t>
+              <a:t>18/07/2022</a:t>
             </a:fld>
             <a:endParaRPr lang="en-GB"/>
           </a:p>
@@ -4400,7 +4676,7 @@
           <a:p>
             <a:fld id="{590D5618-0DC6-4B63-9A13-5E1E28C6EDDB}" type="datetimeFigureOut">
               <a:rPr lang="en-GB" smtClean="0"/>
-              <a:t>17/07/2022</a:t>
+              <a:t>18/07/2022</a:t>
             </a:fld>
             <a:endParaRPr lang="en-GB"/>
           </a:p>
@@ -4616,7 +4892,7 @@
           <a:p>
             <a:fld id="{590D5618-0DC6-4B63-9A13-5E1E28C6EDDB}" type="datetimeFigureOut">
               <a:rPr lang="en-GB" smtClean="0"/>
-              <a:t>17/07/2022</a:t>
+              <a:t>18/07/2022</a:t>
             </a:fld>
             <a:endParaRPr lang="en-GB"/>
           </a:p>
@@ -4832,7 +5108,7 @@
           <a:p>
             <a:fld id="{590D5618-0DC6-4B63-9A13-5E1E28C6EDDB}" type="datetimeFigureOut">
               <a:rPr lang="en-GB" smtClean="0"/>
-              <a:t>17/07/2022</a:t>
+              <a:t>18/07/2022</a:t>
             </a:fld>
             <a:endParaRPr lang="en-GB"/>
           </a:p>
@@ -5114,7 +5390,7 @@
           <a:p>
             <a:fld id="{590D5618-0DC6-4B63-9A13-5E1E28C6EDDB}" type="datetimeFigureOut">
               <a:rPr lang="en-GB" smtClean="0"/>
-              <a:t>17/07/2022</a:t>
+              <a:t>18/07/2022</a:t>
             </a:fld>
             <a:endParaRPr lang="en-GB"/>
           </a:p>
@@ -5396,7 +5672,7 @@
           <a:p>
             <a:fld id="{590D5618-0DC6-4B63-9A13-5E1E28C6EDDB}" type="datetimeFigureOut">
               <a:rPr lang="en-GB" smtClean="0"/>
-              <a:t>17/07/2022</a:t>
+              <a:t>18/07/2022</a:t>
             </a:fld>
             <a:endParaRPr lang="en-GB"/>
           </a:p>
@@ -5826,7 +6102,7 @@
           <a:p>
             <a:fld id="{590D5618-0DC6-4B63-9A13-5E1E28C6EDDB}" type="datetimeFigureOut">
               <a:rPr lang="en-GB" smtClean="0"/>
-              <a:t>17/07/2022</a:t>
+              <a:t>18/07/2022</a:t>
             </a:fld>
             <a:endParaRPr lang="en-GB"/>
           </a:p>
@@ -5976,7 +6252,7 @@
           <a:p>
             <a:fld id="{590D5618-0DC6-4B63-9A13-5E1E28C6EDDB}" type="datetimeFigureOut">
               <a:rPr lang="en-GB" smtClean="0"/>
-              <a:t>17/07/2022</a:t>
+              <a:t>18/07/2022</a:t>
             </a:fld>
             <a:endParaRPr lang="en-GB"/>
           </a:p>
@@ -6089,7 +6365,7 @@
           <a:p>
             <a:fld id="{590D5618-0DC6-4B63-9A13-5E1E28C6EDDB}" type="datetimeFigureOut">
               <a:rPr lang="en-GB" smtClean="0"/>
-              <a:t>17/07/2022</a:t>
+              <a:t>18/07/2022</a:t>
             </a:fld>
             <a:endParaRPr lang="en-GB"/>
           </a:p>
@@ -6411,7 +6687,7 @@
           <a:p>
             <a:fld id="{590D5618-0DC6-4B63-9A13-5E1E28C6EDDB}" type="datetimeFigureOut">
               <a:rPr lang="en-GB" smtClean="0"/>
-              <a:t>17/07/2022</a:t>
+              <a:t>18/07/2022</a:t>
             </a:fld>
             <a:endParaRPr lang="en-GB"/>
           </a:p>
@@ -6709,7 +6985,7 @@
           <a:p>
             <a:fld id="{590D5618-0DC6-4B63-9A13-5E1E28C6EDDB}" type="datetimeFigureOut">
               <a:rPr lang="en-GB" smtClean="0"/>
-              <a:t>17/07/2022</a:t>
+              <a:t>18/07/2022</a:t>
             </a:fld>
             <a:endParaRPr lang="en-GB"/>
           </a:p>
@@ -6848,7 +7124,7 @@
           <a:p>
             <a:fld id="{590D5618-0DC6-4B63-9A13-5E1E28C6EDDB}" type="datetimeFigureOut">
               <a:rPr lang="en-GB" smtClean="0"/>
-              <a:t>17/07/2022</a:t>
+              <a:t>18/07/2022</a:t>
             </a:fld>
             <a:endParaRPr lang="en-GB"/>
           </a:p>
@@ -8260,6 +8536,1540 @@
 </p:sld>
 </file>
 
+<file path=ppt/slides/slide10.xml><?xml version="1.0" encoding="utf-8"?>
+<p:sld xmlns:a="http://schemas.openxmlformats.org/drawingml/2006/main" xmlns:r="http://schemas.openxmlformats.org/officeDocument/2006/relationships" xmlns:p="http://schemas.openxmlformats.org/presentationml/2006/main">
+  <p:cSld>
+    <p:bg>
+      <p:bgPr>
+        <a:solidFill>
+          <a:srgbClr val="BBC5D9"/>
+        </a:solidFill>
+        <a:effectLst/>
+      </p:bgPr>
+    </p:bg>
+    <p:spTree>
+      <p:nvGrpSpPr>
+        <p:cNvPr id="1" name=""/>
+        <p:cNvGrpSpPr/>
+        <p:nvPr/>
+      </p:nvGrpSpPr>
+      <p:grpSpPr>
+        <a:xfrm>
+          <a:off x="0" y="0"/>
+          <a:ext cx="0" cy="0"/>
+          <a:chOff x="0" y="0"/>
+          <a:chExt cx="0" cy="0"/>
+        </a:xfrm>
+      </p:grpSpPr>
+      <p:sp useBgFill="1">
+        <p:nvSpPr>
+          <p:cNvPr id="16" name="Rectangle 15">
+            <a:extLst>
+              <a:ext uri="{FF2B5EF4-FFF2-40B4-BE49-F238E27FC236}">
+                <a16:creationId xmlns:a16="http://schemas.microsoft.com/office/drawing/2014/main" id="{D75A5B51-0925-4835-8511-A0DD17EAA97C}"/>
+              </a:ext>
+              <a:ext uri="{C183D7F6-B498-43B3-948B-1728B52AA6E4}">
+                <adec:decorative xmlns:adec="http://schemas.microsoft.com/office/drawing/2017/decorative" val="1"/>
+              </a:ext>
+            </a:extLst>
+          </p:cNvPr>
+          <p:cNvSpPr>
+            <a:spLocks noGrp="1" noRot="1" noChangeAspect="1" noMove="1" noResize="1" noEditPoints="1" noAdjustHandles="1" noChangeArrowheads="1" noChangeShapeType="1" noTextEdit="1"/>
+          </p:cNvSpPr>
+          <p:nvPr>
+            <p:extLst>
+              <p:ext uri="{386F3935-93C4-4BCD-93E2-E3B085C9AB24}">
+                <p16:designElem xmlns:p16="http://schemas.microsoft.com/office/powerpoint/2015/main" val="1"/>
+              </p:ext>
+            </p:extLst>
+          </p:nvPr>
+        </p:nvSpPr>
+        <p:spPr>
+          <a:xfrm>
+            <a:off x="0" y="0"/>
+            <a:ext cx="12188952" cy="6858000"/>
+          </a:xfrm>
+          <a:prstGeom prst="rect">
+            <a:avLst/>
+          </a:prstGeom>
+          <a:ln>
+            <a:noFill/>
+          </a:ln>
+        </p:spPr>
+        <p:style>
+          <a:lnRef idx="2">
+            <a:schemeClr val="accent1">
+              <a:shade val="50000"/>
+            </a:schemeClr>
+          </a:lnRef>
+          <a:fillRef idx="1">
+            <a:schemeClr val="accent1"/>
+          </a:fillRef>
+          <a:effectRef idx="0">
+            <a:schemeClr val="accent1"/>
+          </a:effectRef>
+          <a:fontRef idx="minor">
+            <a:schemeClr val="lt1"/>
+          </a:fontRef>
+        </p:style>
+        <p:txBody>
+          <a:bodyPr rtlCol="0" anchor="ctr"/>
+          <a:lstStyle/>
+          <a:p>
+            <a:pPr algn="ctr"/>
+            <a:endParaRPr lang="en-US"/>
+          </a:p>
+        </p:txBody>
+      </p:sp>
+      <p:sp>
+        <p:nvSpPr>
+          <p:cNvPr id="2" name="Titolo 1">
+            <a:extLst>
+              <a:ext uri="{FF2B5EF4-FFF2-40B4-BE49-F238E27FC236}">
+                <a16:creationId xmlns:a16="http://schemas.microsoft.com/office/drawing/2014/main" id="{6EA44EF5-F021-10D3-F516-0F4E2FA66B0B}"/>
+              </a:ext>
+            </a:extLst>
+          </p:cNvPr>
+          <p:cNvSpPr>
+            <a:spLocks noGrp="1"/>
+          </p:cNvSpPr>
+          <p:nvPr>
+            <p:ph type="title"/>
+          </p:nvPr>
+        </p:nvSpPr>
+        <p:spPr>
+          <a:xfrm>
+            <a:off x="612648" y="365125"/>
+            <a:ext cx="5295015" cy="2063808"/>
+          </a:xfrm>
+        </p:spPr>
+        <p:txBody>
+          <a:bodyPr anchor="b">
+            <a:normAutofit/>
+          </a:bodyPr>
+          <a:lstStyle/>
+          <a:p>
+            <a:r>
+              <a:rPr lang="it-IT" sz="5400" dirty="0">
+                <a:solidFill>
+                  <a:srgbClr val="ED7D31"/>
+                </a:solidFill>
+              </a:rPr>
+              <a:t>…alle schermate</a:t>
+            </a:r>
+            <a:endParaRPr lang="en-GB" sz="5400" dirty="0">
+              <a:solidFill>
+                <a:srgbClr val="ED7D31"/>
+              </a:solidFill>
+            </a:endParaRPr>
+          </a:p>
+        </p:txBody>
+      </p:sp>
+      <p:sp>
+        <p:nvSpPr>
+          <p:cNvPr id="18" name="Sketch line">
+            <a:extLst>
+              <a:ext uri="{FF2B5EF4-FFF2-40B4-BE49-F238E27FC236}">
+                <a16:creationId xmlns:a16="http://schemas.microsoft.com/office/drawing/2014/main" id="{5CDFD20D-8E4F-4E3A-AF87-93F23E0DBFB3}"/>
+              </a:ext>
+              <a:ext uri="{C183D7F6-B498-43B3-948B-1728B52AA6E4}">
+                <adec:decorative xmlns:adec="http://schemas.microsoft.com/office/drawing/2017/decorative" val="1"/>
+              </a:ext>
+            </a:extLst>
+          </p:cNvPr>
+          <p:cNvSpPr>
+            <a:spLocks noGrp="1" noRot="1" noChangeAspect="1" noMove="1" noResize="1" noEditPoints="1" noAdjustHandles="1" noChangeArrowheads="1" noChangeShapeType="1" noTextEdit="1"/>
+          </p:cNvSpPr>
+          <p:nvPr>
+            <p:extLst>
+              <p:ext uri="{386F3935-93C4-4BCD-93E2-E3B085C9AB24}">
+                <p16:designElem xmlns:p16="http://schemas.microsoft.com/office/powerpoint/2015/main" val="1"/>
+              </p:ext>
+            </p:extLst>
+          </p:nvPr>
+        </p:nvSpPr>
+        <p:spPr>
+          <a:xfrm>
+            <a:off x="838200" y="2650181"/>
+            <a:ext cx="4343400" cy="18288"/>
+          </a:xfrm>
+          <a:custGeom>
+            <a:avLst/>
+            <a:gdLst>
+              <a:gd name="connsiteX0" fmla="*/ 0 w 4343400"/>
+              <a:gd name="connsiteY0" fmla="*/ 0 h 18288"/>
+              <a:gd name="connsiteX1" fmla="*/ 577052 w 4343400"/>
+              <a:gd name="connsiteY1" fmla="*/ 0 h 18288"/>
+              <a:gd name="connsiteX2" fmla="*/ 1067235 w 4343400"/>
+              <a:gd name="connsiteY2" fmla="*/ 0 h 18288"/>
+              <a:gd name="connsiteX3" fmla="*/ 1600853 w 4343400"/>
+              <a:gd name="connsiteY3" fmla="*/ 0 h 18288"/>
+              <a:gd name="connsiteX4" fmla="*/ 2264773 w 4343400"/>
+              <a:gd name="connsiteY4" fmla="*/ 0 h 18288"/>
+              <a:gd name="connsiteX5" fmla="*/ 2841825 w 4343400"/>
+              <a:gd name="connsiteY5" fmla="*/ 0 h 18288"/>
+              <a:gd name="connsiteX6" fmla="*/ 3375442 w 4343400"/>
+              <a:gd name="connsiteY6" fmla="*/ 0 h 18288"/>
+              <a:gd name="connsiteX7" fmla="*/ 4343400 w 4343400"/>
+              <a:gd name="connsiteY7" fmla="*/ 0 h 18288"/>
+              <a:gd name="connsiteX8" fmla="*/ 4343400 w 4343400"/>
+              <a:gd name="connsiteY8" fmla="*/ 18288 h 18288"/>
+              <a:gd name="connsiteX9" fmla="*/ 3722914 w 4343400"/>
+              <a:gd name="connsiteY9" fmla="*/ 18288 h 18288"/>
+              <a:gd name="connsiteX10" fmla="*/ 3189297 w 4343400"/>
+              <a:gd name="connsiteY10" fmla="*/ 18288 h 18288"/>
+              <a:gd name="connsiteX11" fmla="*/ 2481943 w 4343400"/>
+              <a:gd name="connsiteY11" fmla="*/ 18288 h 18288"/>
+              <a:gd name="connsiteX12" fmla="*/ 1904891 w 4343400"/>
+              <a:gd name="connsiteY12" fmla="*/ 18288 h 18288"/>
+              <a:gd name="connsiteX13" fmla="*/ 1414707 w 4343400"/>
+              <a:gd name="connsiteY13" fmla="*/ 18288 h 18288"/>
+              <a:gd name="connsiteX14" fmla="*/ 750788 w 4343400"/>
+              <a:gd name="connsiteY14" fmla="*/ 18288 h 18288"/>
+              <a:gd name="connsiteX15" fmla="*/ 0 w 4343400"/>
+              <a:gd name="connsiteY15" fmla="*/ 18288 h 18288"/>
+              <a:gd name="connsiteX16" fmla="*/ 0 w 4343400"/>
+              <a:gd name="connsiteY16" fmla="*/ 0 h 18288"/>
+            </a:gdLst>
+            <a:ahLst/>
+            <a:cxnLst>
+              <a:cxn ang="0">
+                <a:pos x="connsiteX0" y="connsiteY0"/>
+              </a:cxn>
+              <a:cxn ang="0">
+                <a:pos x="connsiteX1" y="connsiteY1"/>
+              </a:cxn>
+              <a:cxn ang="0">
+                <a:pos x="connsiteX2" y="connsiteY2"/>
+              </a:cxn>
+              <a:cxn ang="0">
+                <a:pos x="connsiteX3" y="connsiteY3"/>
+              </a:cxn>
+              <a:cxn ang="0">
+                <a:pos x="connsiteX4" y="connsiteY4"/>
+              </a:cxn>
+              <a:cxn ang="0">
+                <a:pos x="connsiteX5" y="connsiteY5"/>
+              </a:cxn>
+              <a:cxn ang="0">
+                <a:pos x="connsiteX6" y="connsiteY6"/>
+              </a:cxn>
+              <a:cxn ang="0">
+                <a:pos x="connsiteX7" y="connsiteY7"/>
+              </a:cxn>
+              <a:cxn ang="0">
+                <a:pos x="connsiteX8" y="connsiteY8"/>
+              </a:cxn>
+              <a:cxn ang="0">
+                <a:pos x="connsiteX9" y="connsiteY9"/>
+              </a:cxn>
+              <a:cxn ang="0">
+                <a:pos x="connsiteX10" y="connsiteY10"/>
+              </a:cxn>
+              <a:cxn ang="0">
+                <a:pos x="connsiteX11" y="connsiteY11"/>
+              </a:cxn>
+              <a:cxn ang="0">
+                <a:pos x="connsiteX12" y="connsiteY12"/>
+              </a:cxn>
+              <a:cxn ang="0">
+                <a:pos x="connsiteX13" y="connsiteY13"/>
+              </a:cxn>
+              <a:cxn ang="0">
+                <a:pos x="connsiteX14" y="connsiteY14"/>
+              </a:cxn>
+              <a:cxn ang="0">
+                <a:pos x="connsiteX15" y="connsiteY15"/>
+              </a:cxn>
+              <a:cxn ang="0">
+                <a:pos x="connsiteX16" y="connsiteY16"/>
+              </a:cxn>
+            </a:cxnLst>
+            <a:rect l="l" t="t" r="r" b="b"/>
+            <a:pathLst>
+              <a:path w="4343400" h="18288" fill="none" extrusionOk="0">
+                <a:moveTo>
+                  <a:pt x="0" y="0"/>
+                </a:moveTo>
+                <a:cubicBezTo>
+                  <a:pt x="233209" y="-19550"/>
+                  <a:pt x="330816" y="19068"/>
+                  <a:pt x="577052" y="0"/>
+                </a:cubicBezTo>
+                <a:cubicBezTo>
+                  <a:pt x="823288" y="-19068"/>
+                  <a:pt x="875077" y="10360"/>
+                  <a:pt x="1067235" y="0"/>
+                </a:cubicBezTo>
+                <a:cubicBezTo>
+                  <a:pt x="1259393" y="-10360"/>
+                  <a:pt x="1410699" y="2939"/>
+                  <a:pt x="1600853" y="0"/>
+                </a:cubicBezTo>
+                <a:cubicBezTo>
+                  <a:pt x="1791007" y="-2939"/>
+                  <a:pt x="2101644" y="-26225"/>
+                  <a:pt x="2264773" y="0"/>
+                </a:cubicBezTo>
+                <a:cubicBezTo>
+                  <a:pt x="2427902" y="26225"/>
+                  <a:pt x="2690426" y="-27726"/>
+                  <a:pt x="2841825" y="0"/>
+                </a:cubicBezTo>
+                <a:cubicBezTo>
+                  <a:pt x="2993224" y="27726"/>
+                  <a:pt x="3172320" y="-18569"/>
+                  <a:pt x="3375442" y="0"/>
+                </a:cubicBezTo>
+                <a:cubicBezTo>
+                  <a:pt x="3578564" y="18569"/>
+                  <a:pt x="4003119" y="21909"/>
+                  <a:pt x="4343400" y="0"/>
+                </a:cubicBezTo>
+                <a:cubicBezTo>
+                  <a:pt x="4343798" y="7429"/>
+                  <a:pt x="4343380" y="10822"/>
+                  <a:pt x="4343400" y="18288"/>
+                </a:cubicBezTo>
+                <a:cubicBezTo>
+                  <a:pt x="4109047" y="14709"/>
+                  <a:pt x="3996986" y="7919"/>
+                  <a:pt x="3722914" y="18288"/>
+                </a:cubicBezTo>
+                <a:cubicBezTo>
+                  <a:pt x="3448842" y="28657"/>
+                  <a:pt x="3340973" y="29252"/>
+                  <a:pt x="3189297" y="18288"/>
+                </a:cubicBezTo>
+                <a:cubicBezTo>
+                  <a:pt x="3037621" y="7324"/>
+                  <a:pt x="2636891" y="-9539"/>
+                  <a:pt x="2481943" y="18288"/>
+                </a:cubicBezTo>
+                <a:cubicBezTo>
+                  <a:pt x="2326995" y="46115"/>
+                  <a:pt x="2131632" y="740"/>
+                  <a:pt x="1904891" y="18288"/>
+                </a:cubicBezTo>
+                <a:cubicBezTo>
+                  <a:pt x="1678150" y="35836"/>
+                  <a:pt x="1575362" y="-3381"/>
+                  <a:pt x="1414707" y="18288"/>
+                </a:cubicBezTo>
+                <a:cubicBezTo>
+                  <a:pt x="1254052" y="39957"/>
+                  <a:pt x="1051093" y="-335"/>
+                  <a:pt x="750788" y="18288"/>
+                </a:cubicBezTo>
+                <a:cubicBezTo>
+                  <a:pt x="450483" y="36911"/>
+                  <a:pt x="293781" y="22900"/>
+                  <a:pt x="0" y="18288"/>
+                </a:cubicBezTo>
+                <a:cubicBezTo>
+                  <a:pt x="-591" y="13205"/>
+                  <a:pt x="-663" y="6329"/>
+                  <a:pt x="0" y="0"/>
+                </a:cubicBezTo>
+                <a:close/>
+              </a:path>
+              <a:path w="4343400" h="18288" stroke="0" extrusionOk="0">
+                <a:moveTo>
+                  <a:pt x="0" y="0"/>
+                </a:moveTo>
+                <a:cubicBezTo>
+                  <a:pt x="212719" y="-28531"/>
+                  <a:pt x="340561" y="-1164"/>
+                  <a:pt x="577052" y="0"/>
+                </a:cubicBezTo>
+                <a:cubicBezTo>
+                  <a:pt x="813543" y="1164"/>
+                  <a:pt x="866967" y="-9376"/>
+                  <a:pt x="1067235" y="0"/>
+                </a:cubicBezTo>
+                <a:cubicBezTo>
+                  <a:pt x="1267503" y="9376"/>
+                  <a:pt x="1485778" y="-20470"/>
+                  <a:pt x="1774589" y="0"/>
+                </a:cubicBezTo>
+                <a:cubicBezTo>
+                  <a:pt x="2063400" y="20470"/>
+                  <a:pt x="2090152" y="-14502"/>
+                  <a:pt x="2351641" y="0"/>
+                </a:cubicBezTo>
+                <a:cubicBezTo>
+                  <a:pt x="2613130" y="14502"/>
+                  <a:pt x="2802864" y="19125"/>
+                  <a:pt x="2928693" y="0"/>
+                </a:cubicBezTo>
+                <a:cubicBezTo>
+                  <a:pt x="3054522" y="-19125"/>
+                  <a:pt x="3482611" y="-2038"/>
+                  <a:pt x="3636046" y="0"/>
+                </a:cubicBezTo>
+                <a:cubicBezTo>
+                  <a:pt x="3789481" y="2038"/>
+                  <a:pt x="4012363" y="973"/>
+                  <a:pt x="4343400" y="0"/>
+                </a:cubicBezTo>
+                <a:cubicBezTo>
+                  <a:pt x="4342514" y="5429"/>
+                  <a:pt x="4344221" y="14046"/>
+                  <a:pt x="4343400" y="18288"/>
+                </a:cubicBezTo>
+                <a:cubicBezTo>
+                  <a:pt x="4078870" y="-6138"/>
+                  <a:pt x="4015967" y="29658"/>
+                  <a:pt x="3809782" y="18288"/>
+                </a:cubicBezTo>
+                <a:cubicBezTo>
+                  <a:pt x="3603597" y="6918"/>
+                  <a:pt x="3495552" y="24439"/>
+                  <a:pt x="3189297" y="18288"/>
+                </a:cubicBezTo>
+                <a:cubicBezTo>
+                  <a:pt x="2883042" y="12137"/>
+                  <a:pt x="2850610" y="32583"/>
+                  <a:pt x="2568811" y="18288"/>
+                </a:cubicBezTo>
+                <a:cubicBezTo>
+                  <a:pt x="2287012" y="3993"/>
+                  <a:pt x="2279820" y="23580"/>
+                  <a:pt x="1991759" y="18288"/>
+                </a:cubicBezTo>
+                <a:cubicBezTo>
+                  <a:pt x="1703698" y="12996"/>
+                  <a:pt x="1616455" y="23157"/>
+                  <a:pt x="1284405" y="18288"/>
+                </a:cubicBezTo>
+                <a:cubicBezTo>
+                  <a:pt x="952355" y="13419"/>
+                  <a:pt x="783530" y="16053"/>
+                  <a:pt x="577052" y="18288"/>
+                </a:cubicBezTo>
+                <a:cubicBezTo>
+                  <a:pt x="370574" y="20523"/>
+                  <a:pt x="173929" y="5195"/>
+                  <a:pt x="0" y="18288"/>
+                </a:cubicBezTo>
+                <a:cubicBezTo>
+                  <a:pt x="668" y="13665"/>
+                  <a:pt x="578" y="5675"/>
+                  <a:pt x="0" y="0"/>
+                </a:cubicBezTo>
+                <a:close/>
+              </a:path>
+            </a:pathLst>
+          </a:custGeom>
+          <a:solidFill>
+            <a:schemeClr val="accent2"/>
+          </a:solidFill>
+          <a:ln w="41275" cap="rnd">
+            <a:solidFill>
+              <a:schemeClr val="accent2"/>
+            </a:solidFill>
+            <a:round/>
+            <a:extLst>
+              <a:ext uri="{C807C97D-BFC1-408E-A445-0C87EB9F89A2}">
+                <ask:lineSketchStyleProps xmlns:ask="http://schemas.microsoft.com/office/drawing/2018/sketchyshapes" sd="1219033472">
+                  <a:prstGeom prst="rect">
+                    <a:avLst/>
+                  </a:prstGeom>
+                  <ask:type>
+                    <ask:lineSketchFreehand/>
+                  </ask:type>
+                </ask:lineSketchStyleProps>
+              </a:ext>
+            </a:extLst>
+          </a:ln>
+        </p:spPr>
+        <p:style>
+          <a:lnRef idx="2">
+            <a:schemeClr val="accent1">
+              <a:shade val="50000"/>
+            </a:schemeClr>
+          </a:lnRef>
+          <a:fillRef idx="1">
+            <a:schemeClr val="accent1"/>
+          </a:fillRef>
+          <a:effectRef idx="0">
+            <a:schemeClr val="accent1"/>
+          </a:effectRef>
+          <a:fontRef idx="minor">
+            <a:schemeClr val="lt1"/>
+          </a:fontRef>
+        </p:style>
+        <p:txBody>
+          <a:bodyPr rtlCol="0" anchor="ctr"/>
+          <a:lstStyle/>
+          <a:p>
+            <a:pPr algn="ctr"/>
+            <a:endParaRPr lang="en-US"/>
+          </a:p>
+        </p:txBody>
+      </p:sp>
+      <p:pic>
+        <p:nvPicPr>
+          <p:cNvPr id="5" name="Segnaposto contenuto 4">
+            <a:extLst>
+              <a:ext uri="{FF2B5EF4-FFF2-40B4-BE49-F238E27FC236}">
+                <a16:creationId xmlns:a16="http://schemas.microsoft.com/office/drawing/2014/main" id="{7E3A1EF7-2E0A-6C05-4DE8-D5E920FF2446}"/>
+              </a:ext>
+            </a:extLst>
+          </p:cNvPr>
+          <p:cNvPicPr>
+            <a:picLocks noChangeAspect="1"/>
+          </p:cNvPicPr>
+          <p:nvPr/>
+        </p:nvPicPr>
+        <p:blipFill>
+          <a:blip r:embed="rId2">
+            <a:extLst>
+              <a:ext uri="{28A0092B-C50C-407E-A947-70E740481C1C}">
+                <a14:useLocalDpi xmlns:a14="http://schemas.microsoft.com/office/drawing/2010/main" val="0"/>
+              </a:ext>
+            </a:extLst>
+          </a:blip>
+          <a:stretch>
+            <a:fillRect/>
+          </a:stretch>
+        </p:blipFill>
+        <p:spPr>
+          <a:xfrm>
+            <a:off x="564827" y="3945982"/>
+            <a:ext cx="4890145" cy="2750705"/>
+          </a:xfrm>
+          <a:prstGeom prst="rect">
+            <a:avLst/>
+          </a:prstGeom>
+        </p:spPr>
+      </p:pic>
+      <p:pic>
+        <p:nvPicPr>
+          <p:cNvPr id="9" name="Immagine 8" descr="Immagine che contiene testo&#10;&#10;Descrizione generata automaticamente">
+            <a:extLst>
+              <a:ext uri="{FF2B5EF4-FFF2-40B4-BE49-F238E27FC236}">
+                <a16:creationId xmlns:a16="http://schemas.microsoft.com/office/drawing/2014/main" id="{66D7419E-A4B0-C6C1-476C-EFD3D1D93A21}"/>
+              </a:ext>
+            </a:extLst>
+          </p:cNvPr>
+          <p:cNvPicPr>
+            <a:picLocks noChangeAspect="1"/>
+          </p:cNvPicPr>
+          <p:nvPr/>
+        </p:nvPicPr>
+        <p:blipFill>
+          <a:blip r:embed="rId3">
+            <a:extLst>
+              <a:ext uri="{28A0092B-C50C-407E-A947-70E740481C1C}">
+                <a14:useLocalDpi xmlns:a14="http://schemas.microsoft.com/office/drawing/2010/main" val="0"/>
+              </a:ext>
+            </a:extLst>
+          </a:blip>
+          <a:stretch>
+            <a:fillRect/>
+          </a:stretch>
+        </p:blipFill>
+        <p:spPr>
+          <a:xfrm>
+            <a:off x="6451621" y="678295"/>
+            <a:ext cx="4890145" cy="2750705"/>
+          </a:xfrm>
+          <a:prstGeom prst="rect">
+            <a:avLst/>
+          </a:prstGeom>
+        </p:spPr>
+      </p:pic>
+      <p:pic>
+        <p:nvPicPr>
+          <p:cNvPr id="7" name="Immagine 6">
+            <a:extLst>
+              <a:ext uri="{FF2B5EF4-FFF2-40B4-BE49-F238E27FC236}">
+                <a16:creationId xmlns:a16="http://schemas.microsoft.com/office/drawing/2014/main" id="{DD3F9B97-51DA-85FA-3F5D-25D9E442075B}"/>
+              </a:ext>
+            </a:extLst>
+          </p:cNvPr>
+          <p:cNvPicPr>
+            <a:picLocks noChangeAspect="1"/>
+          </p:cNvPicPr>
+          <p:nvPr/>
+        </p:nvPicPr>
+        <p:blipFill>
+          <a:blip r:embed="rId4">
+            <a:extLst>
+              <a:ext uri="{28A0092B-C50C-407E-A947-70E740481C1C}">
+                <a14:useLocalDpi xmlns:a14="http://schemas.microsoft.com/office/drawing/2010/main" val="0"/>
+              </a:ext>
+            </a:extLst>
+          </a:blip>
+          <a:stretch>
+            <a:fillRect/>
+          </a:stretch>
+        </p:blipFill>
+        <p:spPr>
+          <a:xfrm>
+            <a:off x="6451624" y="3945983"/>
+            <a:ext cx="4890142" cy="2750705"/>
+          </a:xfrm>
+          <a:prstGeom prst="rect">
+            <a:avLst/>
+          </a:prstGeom>
+        </p:spPr>
+      </p:pic>
+      <p:pic>
+        <p:nvPicPr>
+          <p:cNvPr id="14" name="Immagine 13">
+            <a:extLst>
+              <a:ext uri="{FF2B5EF4-FFF2-40B4-BE49-F238E27FC236}">
+                <a16:creationId xmlns:a16="http://schemas.microsoft.com/office/drawing/2014/main" id="{9CEFDD91-26D7-71EE-769D-C7D99865663E}"/>
+              </a:ext>
+            </a:extLst>
+          </p:cNvPr>
+          <p:cNvPicPr>
+            <a:picLocks noChangeAspect="1"/>
+          </p:cNvPicPr>
+          <p:nvPr/>
+        </p:nvPicPr>
+        <p:blipFill>
+          <a:blip r:embed="rId5">
+            <a:extLst>
+              <a:ext uri="{28A0092B-C50C-407E-A947-70E740481C1C}">
+                <a14:useLocalDpi xmlns:a14="http://schemas.microsoft.com/office/drawing/2010/main" val="0"/>
+              </a:ext>
+            </a:extLst>
+          </a:blip>
+          <a:stretch>
+            <a:fillRect/>
+          </a:stretch>
+        </p:blipFill>
+        <p:spPr>
+          <a:xfrm>
+            <a:off x="11212066" y="271844"/>
+            <a:ext cx="677507" cy="483933"/>
+          </a:xfrm>
+          <a:prstGeom prst="rect">
+            <a:avLst/>
+          </a:prstGeom>
+        </p:spPr>
+      </p:pic>
+    </p:spTree>
+    <p:extLst>
+      <p:ext uri="{BB962C8B-B14F-4D97-AF65-F5344CB8AC3E}">
+        <p14:creationId xmlns:p14="http://schemas.microsoft.com/office/powerpoint/2010/main" val="1363856293"/>
+      </p:ext>
+    </p:extLst>
+  </p:cSld>
+  <p:clrMapOvr>
+    <a:masterClrMapping/>
+  </p:clrMapOvr>
+</p:sld>
+</file>
+
+<file path=ppt/slides/slide11.xml><?xml version="1.0" encoding="utf-8"?>
+<p:sld xmlns:a="http://schemas.openxmlformats.org/drawingml/2006/main" xmlns:r="http://schemas.openxmlformats.org/officeDocument/2006/relationships" xmlns:p="http://schemas.openxmlformats.org/presentationml/2006/main">
+  <p:cSld>
+    <p:bg>
+      <p:bgPr>
+        <a:solidFill>
+          <a:srgbClr val="BBC5D9"/>
+        </a:solidFill>
+        <a:effectLst/>
+      </p:bgPr>
+    </p:bg>
+    <p:spTree>
+      <p:nvGrpSpPr>
+        <p:cNvPr id="1" name=""/>
+        <p:cNvGrpSpPr/>
+        <p:nvPr/>
+      </p:nvGrpSpPr>
+      <p:grpSpPr>
+        <a:xfrm>
+          <a:off x="0" y="0"/>
+          <a:ext cx="0" cy="0"/>
+          <a:chOff x="0" y="0"/>
+          <a:chExt cx="0" cy="0"/>
+        </a:xfrm>
+      </p:grpSpPr>
+      <p:sp useBgFill="1">
+        <p:nvSpPr>
+          <p:cNvPr id="8" name="Rectangle 7">
+            <a:extLst>
+              <a:ext uri="{FF2B5EF4-FFF2-40B4-BE49-F238E27FC236}">
+                <a16:creationId xmlns:a16="http://schemas.microsoft.com/office/drawing/2014/main" id="{100EDD19-6802-4EC3-95CE-CFFAB042CFD6}"/>
+              </a:ext>
+              <a:ext uri="{C183D7F6-B498-43B3-948B-1728B52AA6E4}">
+                <adec:decorative xmlns:adec="http://schemas.microsoft.com/office/drawing/2017/decorative" val="1"/>
+              </a:ext>
+            </a:extLst>
+          </p:cNvPr>
+          <p:cNvSpPr>
+            <a:spLocks noGrp="1" noRot="1" noChangeAspect="1" noMove="1" noResize="1" noEditPoints="1" noAdjustHandles="1" noChangeArrowheads="1" noChangeShapeType="1" noTextEdit="1"/>
+          </p:cNvSpPr>
+          <p:nvPr>
+            <p:extLst>
+              <p:ext uri="{386F3935-93C4-4BCD-93E2-E3B085C9AB24}">
+                <p16:designElem xmlns:p16="http://schemas.microsoft.com/office/powerpoint/2015/main" val="1"/>
+              </p:ext>
+            </p:extLst>
+          </p:nvPr>
+        </p:nvSpPr>
+        <p:spPr>
+          <a:xfrm>
+            <a:off x="0" y="0"/>
+            <a:ext cx="12188952" cy="6858000"/>
+          </a:xfrm>
+          <a:prstGeom prst="rect">
+            <a:avLst/>
+          </a:prstGeom>
+          <a:ln>
+            <a:noFill/>
+          </a:ln>
+        </p:spPr>
+        <p:style>
+          <a:lnRef idx="2">
+            <a:schemeClr val="accent1">
+              <a:shade val="50000"/>
+            </a:schemeClr>
+          </a:lnRef>
+          <a:fillRef idx="1">
+            <a:schemeClr val="accent1"/>
+          </a:fillRef>
+          <a:effectRef idx="0">
+            <a:schemeClr val="accent1"/>
+          </a:effectRef>
+          <a:fontRef idx="minor">
+            <a:schemeClr val="lt1"/>
+          </a:fontRef>
+        </p:style>
+        <p:txBody>
+          <a:bodyPr rtlCol="0" anchor="ctr"/>
+          <a:lstStyle/>
+          <a:p>
+            <a:pPr algn="ctr"/>
+            <a:endParaRPr lang="en-US"/>
+          </a:p>
+        </p:txBody>
+      </p:sp>
+      <p:sp>
+        <p:nvSpPr>
+          <p:cNvPr id="2" name="Titolo 1">
+            <a:extLst>
+              <a:ext uri="{FF2B5EF4-FFF2-40B4-BE49-F238E27FC236}">
+                <a16:creationId xmlns:a16="http://schemas.microsoft.com/office/drawing/2014/main" id="{E13D1BB6-BF57-2463-DBAD-8522EEAD3363}"/>
+              </a:ext>
+            </a:extLst>
+          </p:cNvPr>
+          <p:cNvSpPr>
+            <a:spLocks noGrp="1"/>
+          </p:cNvSpPr>
+          <p:nvPr>
+            <p:ph type="title"/>
+          </p:nvPr>
+        </p:nvSpPr>
+        <p:spPr>
+          <a:xfrm>
+            <a:off x="838200" y="365125"/>
+            <a:ext cx="10515600" cy="1325563"/>
+          </a:xfrm>
+        </p:spPr>
+        <p:txBody>
+          <a:bodyPr>
+            <a:normAutofit fontScale="90000"/>
+          </a:bodyPr>
+          <a:lstStyle/>
+          <a:p>
+            <a:r>
+              <a:rPr lang="it-IT" sz="5400" dirty="0">
+                <a:solidFill>
+                  <a:srgbClr val="ED7D31"/>
+                </a:solidFill>
+              </a:rPr>
+              <a:t>Considerazioni finali e sviluppi futuri</a:t>
+            </a:r>
+            <a:endParaRPr lang="en-GB" sz="5400" dirty="0">
+              <a:solidFill>
+                <a:srgbClr val="ED7D31"/>
+              </a:solidFill>
+            </a:endParaRPr>
+          </a:p>
+        </p:txBody>
+      </p:sp>
+      <p:sp>
+        <p:nvSpPr>
+          <p:cNvPr id="10" name="sketch line">
+            <a:extLst>
+              <a:ext uri="{FF2B5EF4-FFF2-40B4-BE49-F238E27FC236}">
+                <a16:creationId xmlns:a16="http://schemas.microsoft.com/office/drawing/2014/main" id="{DB17E863-922E-4C26-BD64-E8FD41D28661}"/>
+              </a:ext>
+              <a:ext uri="{C183D7F6-B498-43B3-948B-1728B52AA6E4}">
+                <adec:decorative xmlns:adec="http://schemas.microsoft.com/office/drawing/2017/decorative" val="1"/>
+              </a:ext>
+            </a:extLst>
+          </p:cNvPr>
+          <p:cNvSpPr>
+            <a:spLocks noGrp="1" noRot="1" noChangeAspect="1" noMove="1" noResize="1" noEditPoints="1" noAdjustHandles="1" noChangeArrowheads="1" noChangeShapeType="1" noTextEdit="1"/>
+          </p:cNvSpPr>
+          <p:nvPr>
+            <p:extLst>
+              <p:ext uri="{386F3935-93C4-4BCD-93E2-E3B085C9AB24}">
+                <p16:designElem xmlns:p16="http://schemas.microsoft.com/office/powerpoint/2015/main" val="1"/>
+              </p:ext>
+            </p:extLst>
+          </p:nvPr>
+        </p:nvSpPr>
+        <p:spPr>
+          <a:xfrm>
+            <a:off x="669036" y="1677373"/>
+            <a:ext cx="10853928" cy="18288"/>
+          </a:xfrm>
+          <a:custGeom>
+            <a:avLst/>
+            <a:gdLst>
+              <a:gd name="connsiteX0" fmla="*/ 0 w 10853928"/>
+              <a:gd name="connsiteY0" fmla="*/ 0 h 18288"/>
+              <a:gd name="connsiteX1" fmla="*/ 461292 w 10853928"/>
+              <a:gd name="connsiteY1" fmla="*/ 0 h 18288"/>
+              <a:gd name="connsiteX2" fmla="*/ 1139662 w 10853928"/>
+              <a:gd name="connsiteY2" fmla="*/ 0 h 18288"/>
+              <a:gd name="connsiteX3" fmla="*/ 1926572 w 10853928"/>
+              <a:gd name="connsiteY3" fmla="*/ 0 h 18288"/>
+              <a:gd name="connsiteX4" fmla="*/ 2279325 w 10853928"/>
+              <a:gd name="connsiteY4" fmla="*/ 0 h 18288"/>
+              <a:gd name="connsiteX5" fmla="*/ 2632078 w 10853928"/>
+              <a:gd name="connsiteY5" fmla="*/ 0 h 18288"/>
+              <a:gd name="connsiteX6" fmla="*/ 3527527 w 10853928"/>
+              <a:gd name="connsiteY6" fmla="*/ 0 h 18288"/>
+              <a:gd name="connsiteX7" fmla="*/ 4205897 w 10853928"/>
+              <a:gd name="connsiteY7" fmla="*/ 0 h 18288"/>
+              <a:gd name="connsiteX8" fmla="*/ 4558650 w 10853928"/>
+              <a:gd name="connsiteY8" fmla="*/ 0 h 18288"/>
+              <a:gd name="connsiteX9" fmla="*/ 5237020 w 10853928"/>
+              <a:gd name="connsiteY9" fmla="*/ 0 h 18288"/>
+              <a:gd name="connsiteX10" fmla="*/ 6132469 w 10853928"/>
+              <a:gd name="connsiteY10" fmla="*/ 0 h 18288"/>
+              <a:gd name="connsiteX11" fmla="*/ 6702301 w 10853928"/>
+              <a:gd name="connsiteY11" fmla="*/ 0 h 18288"/>
+              <a:gd name="connsiteX12" fmla="*/ 7272132 w 10853928"/>
+              <a:gd name="connsiteY12" fmla="*/ 0 h 18288"/>
+              <a:gd name="connsiteX13" fmla="*/ 7950502 w 10853928"/>
+              <a:gd name="connsiteY13" fmla="*/ 0 h 18288"/>
+              <a:gd name="connsiteX14" fmla="*/ 8737412 w 10853928"/>
+              <a:gd name="connsiteY14" fmla="*/ 0 h 18288"/>
+              <a:gd name="connsiteX15" fmla="*/ 9524322 w 10853928"/>
+              <a:gd name="connsiteY15" fmla="*/ 0 h 18288"/>
+              <a:gd name="connsiteX16" fmla="*/ 10853928 w 10853928"/>
+              <a:gd name="connsiteY16" fmla="*/ 0 h 18288"/>
+              <a:gd name="connsiteX17" fmla="*/ 10853928 w 10853928"/>
+              <a:gd name="connsiteY17" fmla="*/ 18288 h 18288"/>
+              <a:gd name="connsiteX18" fmla="*/ 10392636 w 10853928"/>
+              <a:gd name="connsiteY18" fmla="*/ 18288 h 18288"/>
+              <a:gd name="connsiteX19" fmla="*/ 9497187 w 10853928"/>
+              <a:gd name="connsiteY19" fmla="*/ 18288 h 18288"/>
+              <a:gd name="connsiteX20" fmla="*/ 8818817 w 10853928"/>
+              <a:gd name="connsiteY20" fmla="*/ 18288 h 18288"/>
+              <a:gd name="connsiteX21" fmla="*/ 8466064 w 10853928"/>
+              <a:gd name="connsiteY21" fmla="*/ 18288 h 18288"/>
+              <a:gd name="connsiteX22" fmla="*/ 7787693 w 10853928"/>
+              <a:gd name="connsiteY22" fmla="*/ 18288 h 18288"/>
+              <a:gd name="connsiteX23" fmla="*/ 7217862 w 10853928"/>
+              <a:gd name="connsiteY23" fmla="*/ 18288 h 18288"/>
+              <a:gd name="connsiteX24" fmla="*/ 6648031 w 10853928"/>
+              <a:gd name="connsiteY24" fmla="*/ 18288 h 18288"/>
+              <a:gd name="connsiteX25" fmla="*/ 6078200 w 10853928"/>
+              <a:gd name="connsiteY25" fmla="*/ 18288 h 18288"/>
+              <a:gd name="connsiteX26" fmla="*/ 5508368 w 10853928"/>
+              <a:gd name="connsiteY26" fmla="*/ 18288 h 18288"/>
+              <a:gd name="connsiteX27" fmla="*/ 4721459 w 10853928"/>
+              <a:gd name="connsiteY27" fmla="*/ 18288 h 18288"/>
+              <a:gd name="connsiteX28" fmla="*/ 4043088 w 10853928"/>
+              <a:gd name="connsiteY28" fmla="*/ 18288 h 18288"/>
+              <a:gd name="connsiteX29" fmla="*/ 3690336 w 10853928"/>
+              <a:gd name="connsiteY29" fmla="*/ 18288 h 18288"/>
+              <a:gd name="connsiteX30" fmla="*/ 3120504 w 10853928"/>
+              <a:gd name="connsiteY30" fmla="*/ 18288 h 18288"/>
+              <a:gd name="connsiteX31" fmla="*/ 2333595 w 10853928"/>
+              <a:gd name="connsiteY31" fmla="*/ 18288 h 18288"/>
+              <a:gd name="connsiteX32" fmla="*/ 1872303 w 10853928"/>
+              <a:gd name="connsiteY32" fmla="*/ 18288 h 18288"/>
+              <a:gd name="connsiteX33" fmla="*/ 976854 w 10853928"/>
+              <a:gd name="connsiteY33" fmla="*/ 18288 h 18288"/>
+              <a:gd name="connsiteX34" fmla="*/ 0 w 10853928"/>
+              <a:gd name="connsiteY34" fmla="*/ 18288 h 18288"/>
+              <a:gd name="connsiteX35" fmla="*/ 0 w 10853928"/>
+              <a:gd name="connsiteY35" fmla="*/ 0 h 18288"/>
+            </a:gdLst>
+            <a:ahLst/>
+            <a:cxnLst>
+              <a:cxn ang="0">
+                <a:pos x="connsiteX0" y="connsiteY0"/>
+              </a:cxn>
+              <a:cxn ang="0">
+                <a:pos x="connsiteX1" y="connsiteY1"/>
+              </a:cxn>
+              <a:cxn ang="0">
+                <a:pos x="connsiteX2" y="connsiteY2"/>
+              </a:cxn>
+              <a:cxn ang="0">
+                <a:pos x="connsiteX3" y="connsiteY3"/>
+              </a:cxn>
+              <a:cxn ang="0">
+                <a:pos x="connsiteX4" y="connsiteY4"/>
+              </a:cxn>
+              <a:cxn ang="0">
+                <a:pos x="connsiteX5" y="connsiteY5"/>
+              </a:cxn>
+              <a:cxn ang="0">
+                <a:pos x="connsiteX6" y="connsiteY6"/>
+              </a:cxn>
+              <a:cxn ang="0">
+                <a:pos x="connsiteX7" y="connsiteY7"/>
+              </a:cxn>
+              <a:cxn ang="0">
+                <a:pos x="connsiteX8" y="connsiteY8"/>
+              </a:cxn>
+              <a:cxn ang="0">
+                <a:pos x="connsiteX9" y="connsiteY9"/>
+              </a:cxn>
+              <a:cxn ang="0">
+                <a:pos x="connsiteX10" y="connsiteY10"/>
+              </a:cxn>
+              <a:cxn ang="0">
+                <a:pos x="connsiteX11" y="connsiteY11"/>
+              </a:cxn>
+              <a:cxn ang="0">
+                <a:pos x="connsiteX12" y="connsiteY12"/>
+              </a:cxn>
+              <a:cxn ang="0">
+                <a:pos x="connsiteX13" y="connsiteY13"/>
+              </a:cxn>
+              <a:cxn ang="0">
+                <a:pos x="connsiteX14" y="connsiteY14"/>
+              </a:cxn>
+              <a:cxn ang="0">
+                <a:pos x="connsiteX15" y="connsiteY15"/>
+              </a:cxn>
+              <a:cxn ang="0">
+                <a:pos x="connsiteX16" y="connsiteY16"/>
+              </a:cxn>
+              <a:cxn ang="0">
+                <a:pos x="connsiteX17" y="connsiteY17"/>
+              </a:cxn>
+              <a:cxn ang="0">
+                <a:pos x="connsiteX18" y="connsiteY18"/>
+              </a:cxn>
+              <a:cxn ang="0">
+                <a:pos x="connsiteX19" y="connsiteY19"/>
+              </a:cxn>
+              <a:cxn ang="0">
+                <a:pos x="connsiteX20" y="connsiteY20"/>
+              </a:cxn>
+              <a:cxn ang="0">
+                <a:pos x="connsiteX21" y="connsiteY21"/>
+              </a:cxn>
+              <a:cxn ang="0">
+                <a:pos x="connsiteX22" y="connsiteY22"/>
+              </a:cxn>
+              <a:cxn ang="0">
+                <a:pos x="connsiteX23" y="connsiteY23"/>
+              </a:cxn>
+              <a:cxn ang="0">
+                <a:pos x="connsiteX24" y="connsiteY24"/>
+              </a:cxn>
+              <a:cxn ang="0">
+                <a:pos x="connsiteX25" y="connsiteY25"/>
+              </a:cxn>
+              <a:cxn ang="0">
+                <a:pos x="connsiteX26" y="connsiteY26"/>
+              </a:cxn>
+              <a:cxn ang="0">
+                <a:pos x="connsiteX27" y="connsiteY27"/>
+              </a:cxn>
+              <a:cxn ang="0">
+                <a:pos x="connsiteX28" y="connsiteY28"/>
+              </a:cxn>
+              <a:cxn ang="0">
+                <a:pos x="connsiteX29" y="connsiteY29"/>
+              </a:cxn>
+              <a:cxn ang="0">
+                <a:pos x="connsiteX30" y="connsiteY30"/>
+              </a:cxn>
+              <a:cxn ang="0">
+                <a:pos x="connsiteX31" y="connsiteY31"/>
+              </a:cxn>
+              <a:cxn ang="0">
+                <a:pos x="connsiteX32" y="connsiteY32"/>
+              </a:cxn>
+              <a:cxn ang="0">
+                <a:pos x="connsiteX33" y="connsiteY33"/>
+              </a:cxn>
+              <a:cxn ang="0">
+                <a:pos x="connsiteX34" y="connsiteY34"/>
+              </a:cxn>
+              <a:cxn ang="0">
+                <a:pos x="connsiteX35" y="connsiteY35"/>
+              </a:cxn>
+            </a:cxnLst>
+            <a:rect l="l" t="t" r="r" b="b"/>
+            <a:pathLst>
+              <a:path w="10853928" h="18288" fill="none" extrusionOk="0">
+                <a:moveTo>
+                  <a:pt x="0" y="0"/>
+                </a:moveTo>
+                <a:cubicBezTo>
+                  <a:pt x="146993" y="-19076"/>
+                  <a:pt x="347684" y="-4790"/>
+                  <a:pt x="461292" y="0"/>
+                </a:cubicBezTo>
+                <a:cubicBezTo>
+                  <a:pt x="574900" y="4790"/>
+                  <a:pt x="808367" y="19821"/>
+                  <a:pt x="1139662" y="0"/>
+                </a:cubicBezTo>
+                <a:cubicBezTo>
+                  <a:pt x="1470957" y="-19821"/>
+                  <a:pt x="1627405" y="5721"/>
+                  <a:pt x="1926572" y="0"/>
+                </a:cubicBezTo>
+                <a:cubicBezTo>
+                  <a:pt x="2225739" y="-5721"/>
+                  <a:pt x="2137730" y="-3235"/>
+                  <a:pt x="2279325" y="0"/>
+                </a:cubicBezTo>
+                <a:cubicBezTo>
+                  <a:pt x="2420920" y="3235"/>
+                  <a:pt x="2456518" y="9685"/>
+                  <a:pt x="2632078" y="0"/>
+                </a:cubicBezTo>
+                <a:cubicBezTo>
+                  <a:pt x="2807638" y="-9685"/>
+                  <a:pt x="3211516" y="-43007"/>
+                  <a:pt x="3527527" y="0"/>
+                </a:cubicBezTo>
+                <a:cubicBezTo>
+                  <a:pt x="3843538" y="43007"/>
+                  <a:pt x="4058833" y="22042"/>
+                  <a:pt x="4205897" y="0"/>
+                </a:cubicBezTo>
+                <a:cubicBezTo>
+                  <a:pt x="4352961" y="-22042"/>
+                  <a:pt x="4474805" y="-11846"/>
+                  <a:pt x="4558650" y="0"/>
+                </a:cubicBezTo>
+                <a:cubicBezTo>
+                  <a:pt x="4642495" y="11846"/>
+                  <a:pt x="5041928" y="-6069"/>
+                  <a:pt x="5237020" y="0"/>
+                </a:cubicBezTo>
+                <a:cubicBezTo>
+                  <a:pt x="5432112" y="6069"/>
+                  <a:pt x="5943266" y="-17479"/>
+                  <a:pt x="6132469" y="0"/>
+                </a:cubicBezTo>
+                <a:cubicBezTo>
+                  <a:pt x="6321672" y="17479"/>
+                  <a:pt x="6483872" y="26234"/>
+                  <a:pt x="6702301" y="0"/>
+                </a:cubicBezTo>
+                <a:cubicBezTo>
+                  <a:pt x="6920730" y="-26234"/>
+                  <a:pt x="6991194" y="-15156"/>
+                  <a:pt x="7272132" y="0"/>
+                </a:cubicBezTo>
+                <a:cubicBezTo>
+                  <a:pt x="7553070" y="15156"/>
+                  <a:pt x="7684444" y="-32961"/>
+                  <a:pt x="7950502" y="0"/>
+                </a:cubicBezTo>
+                <a:cubicBezTo>
+                  <a:pt x="8216560" y="32961"/>
+                  <a:pt x="8493290" y="-10491"/>
+                  <a:pt x="8737412" y="0"/>
+                </a:cubicBezTo>
+                <a:cubicBezTo>
+                  <a:pt x="8981534" y="10491"/>
+                  <a:pt x="9191586" y="-13899"/>
+                  <a:pt x="9524322" y="0"/>
+                </a:cubicBezTo>
+                <a:cubicBezTo>
+                  <a:pt x="9857058" y="13899"/>
+                  <a:pt x="10297509" y="7485"/>
+                  <a:pt x="10853928" y="0"/>
+                </a:cubicBezTo>
+                <a:cubicBezTo>
+                  <a:pt x="10854574" y="4451"/>
+                  <a:pt x="10854418" y="9226"/>
+                  <a:pt x="10853928" y="18288"/>
+                </a:cubicBezTo>
+                <a:cubicBezTo>
+                  <a:pt x="10691638" y="28522"/>
+                  <a:pt x="10574319" y="29578"/>
+                  <a:pt x="10392636" y="18288"/>
+                </a:cubicBezTo>
+                <a:cubicBezTo>
+                  <a:pt x="10210953" y="6998"/>
+                  <a:pt x="9836277" y="-16742"/>
+                  <a:pt x="9497187" y="18288"/>
+                </a:cubicBezTo>
+                <a:cubicBezTo>
+                  <a:pt x="9158097" y="53318"/>
+                  <a:pt x="9119479" y="30714"/>
+                  <a:pt x="8818817" y="18288"/>
+                </a:cubicBezTo>
+                <a:cubicBezTo>
+                  <a:pt x="8518155" y="5863"/>
+                  <a:pt x="8640037" y="6483"/>
+                  <a:pt x="8466064" y="18288"/>
+                </a:cubicBezTo>
+                <a:cubicBezTo>
+                  <a:pt x="8292091" y="30093"/>
+                  <a:pt x="7997656" y="18914"/>
+                  <a:pt x="7787693" y="18288"/>
+                </a:cubicBezTo>
+                <a:cubicBezTo>
+                  <a:pt x="7577730" y="17662"/>
+                  <a:pt x="7412468" y="21416"/>
+                  <a:pt x="7217862" y="18288"/>
+                </a:cubicBezTo>
+                <a:cubicBezTo>
+                  <a:pt x="7023256" y="15160"/>
+                  <a:pt x="6898018" y="14824"/>
+                  <a:pt x="6648031" y="18288"/>
+                </a:cubicBezTo>
+                <a:cubicBezTo>
+                  <a:pt x="6398044" y="21752"/>
+                  <a:pt x="6254402" y="38625"/>
+                  <a:pt x="6078200" y="18288"/>
+                </a:cubicBezTo>
+                <a:cubicBezTo>
+                  <a:pt x="5901998" y="-2049"/>
+                  <a:pt x="5622886" y="3213"/>
+                  <a:pt x="5508368" y="18288"/>
+                </a:cubicBezTo>
+                <a:cubicBezTo>
+                  <a:pt x="5393850" y="33363"/>
+                  <a:pt x="5036260" y="26830"/>
+                  <a:pt x="4721459" y="18288"/>
+                </a:cubicBezTo>
+                <a:cubicBezTo>
+                  <a:pt x="4406658" y="9746"/>
+                  <a:pt x="4239221" y="41551"/>
+                  <a:pt x="4043088" y="18288"/>
+                </a:cubicBezTo>
+                <a:cubicBezTo>
+                  <a:pt x="3846955" y="-4975"/>
+                  <a:pt x="3818802" y="34658"/>
+                  <a:pt x="3690336" y="18288"/>
+                </a:cubicBezTo>
+                <a:cubicBezTo>
+                  <a:pt x="3561870" y="1918"/>
+                  <a:pt x="3265491" y="42194"/>
+                  <a:pt x="3120504" y="18288"/>
+                </a:cubicBezTo>
+                <a:cubicBezTo>
+                  <a:pt x="2975517" y="-5618"/>
+                  <a:pt x="2720254" y="36673"/>
+                  <a:pt x="2333595" y="18288"/>
+                </a:cubicBezTo>
+                <a:cubicBezTo>
+                  <a:pt x="1946936" y="-97"/>
+                  <a:pt x="2097241" y="5776"/>
+                  <a:pt x="1872303" y="18288"/>
+                </a:cubicBezTo>
+                <a:cubicBezTo>
+                  <a:pt x="1647365" y="30800"/>
+                  <a:pt x="1282708" y="45380"/>
+                  <a:pt x="976854" y="18288"/>
+                </a:cubicBezTo>
+                <a:cubicBezTo>
+                  <a:pt x="671000" y="-8804"/>
+                  <a:pt x="408401" y="-12775"/>
+                  <a:pt x="0" y="18288"/>
+                </a:cubicBezTo>
+                <a:cubicBezTo>
+                  <a:pt x="-213" y="9468"/>
+                  <a:pt x="187" y="4459"/>
+                  <a:pt x="0" y="0"/>
+                </a:cubicBezTo>
+                <a:close/>
+              </a:path>
+              <a:path w="10853928" h="18288" stroke="0" extrusionOk="0">
+                <a:moveTo>
+                  <a:pt x="0" y="0"/>
+                </a:moveTo>
+                <a:cubicBezTo>
+                  <a:pt x="267322" y="15284"/>
+                  <a:pt x="415388" y="-21048"/>
+                  <a:pt x="569831" y="0"/>
+                </a:cubicBezTo>
+                <a:cubicBezTo>
+                  <a:pt x="724274" y="21048"/>
+                  <a:pt x="769333" y="-2353"/>
+                  <a:pt x="922584" y="0"/>
+                </a:cubicBezTo>
+                <a:cubicBezTo>
+                  <a:pt x="1075835" y="2353"/>
+                  <a:pt x="1399490" y="-145"/>
+                  <a:pt x="1818033" y="0"/>
+                </a:cubicBezTo>
+                <a:cubicBezTo>
+                  <a:pt x="2236576" y="145"/>
+                  <a:pt x="2145330" y="5482"/>
+                  <a:pt x="2387864" y="0"/>
+                </a:cubicBezTo>
+                <a:cubicBezTo>
+                  <a:pt x="2630398" y="-5482"/>
+                  <a:pt x="2793207" y="18487"/>
+                  <a:pt x="2957695" y="0"/>
+                </a:cubicBezTo>
+                <a:cubicBezTo>
+                  <a:pt x="3122183" y="-18487"/>
+                  <a:pt x="3579141" y="19003"/>
+                  <a:pt x="3853144" y="0"/>
+                </a:cubicBezTo>
+                <a:cubicBezTo>
+                  <a:pt x="4127147" y="-19003"/>
+                  <a:pt x="4209857" y="12211"/>
+                  <a:pt x="4314436" y="0"/>
+                </a:cubicBezTo>
+                <a:cubicBezTo>
+                  <a:pt x="4419015" y="-12211"/>
+                  <a:pt x="4762459" y="-17220"/>
+                  <a:pt x="5209885" y="0"/>
+                </a:cubicBezTo>
+                <a:cubicBezTo>
+                  <a:pt x="5657311" y="17220"/>
+                  <a:pt x="5692663" y="-3290"/>
+                  <a:pt x="6105335" y="0"/>
+                </a:cubicBezTo>
+                <a:cubicBezTo>
+                  <a:pt x="6518007" y="3290"/>
+                  <a:pt x="6455516" y="-5124"/>
+                  <a:pt x="6783705" y="0"/>
+                </a:cubicBezTo>
+                <a:cubicBezTo>
+                  <a:pt x="7111894" y="5124"/>
+                  <a:pt x="7441941" y="-17829"/>
+                  <a:pt x="7679154" y="0"/>
+                </a:cubicBezTo>
+                <a:cubicBezTo>
+                  <a:pt x="7916367" y="17829"/>
+                  <a:pt x="8102967" y="-24363"/>
+                  <a:pt x="8248985" y="0"/>
+                </a:cubicBezTo>
+                <a:cubicBezTo>
+                  <a:pt x="8395003" y="24363"/>
+                  <a:pt x="8552393" y="25505"/>
+                  <a:pt x="8818817" y="0"/>
+                </a:cubicBezTo>
+                <a:cubicBezTo>
+                  <a:pt x="9085241" y="-25505"/>
+                  <a:pt x="9411308" y="38000"/>
+                  <a:pt x="9605726" y="0"/>
+                </a:cubicBezTo>
+                <a:cubicBezTo>
+                  <a:pt x="9800144" y="-38000"/>
+                  <a:pt x="10006468" y="-25741"/>
+                  <a:pt x="10175558" y="0"/>
+                </a:cubicBezTo>
+                <a:cubicBezTo>
+                  <a:pt x="10344648" y="25741"/>
+                  <a:pt x="10696282" y="695"/>
+                  <a:pt x="10853928" y="0"/>
+                </a:cubicBezTo>
+                <a:cubicBezTo>
+                  <a:pt x="10853521" y="8690"/>
+                  <a:pt x="10853774" y="14141"/>
+                  <a:pt x="10853928" y="18288"/>
+                </a:cubicBezTo>
+                <a:cubicBezTo>
+                  <a:pt x="10608124" y="24255"/>
+                  <a:pt x="10343415" y="22307"/>
+                  <a:pt x="10067018" y="18288"/>
+                </a:cubicBezTo>
+                <a:cubicBezTo>
+                  <a:pt x="9790621" y="14270"/>
+                  <a:pt x="9843266" y="3564"/>
+                  <a:pt x="9714266" y="18288"/>
+                </a:cubicBezTo>
+                <a:cubicBezTo>
+                  <a:pt x="9585266" y="33012"/>
+                  <a:pt x="9379484" y="1875"/>
+                  <a:pt x="9252974" y="18288"/>
+                </a:cubicBezTo>
+                <a:cubicBezTo>
+                  <a:pt x="9126464" y="34701"/>
+                  <a:pt x="8580678" y="-4904"/>
+                  <a:pt x="8357525" y="18288"/>
+                </a:cubicBezTo>
+                <a:cubicBezTo>
+                  <a:pt x="8134372" y="41480"/>
+                  <a:pt x="7903199" y="26458"/>
+                  <a:pt x="7679154" y="18288"/>
+                </a:cubicBezTo>
+                <a:cubicBezTo>
+                  <a:pt x="7455109" y="10118"/>
+                  <a:pt x="7435944" y="27109"/>
+                  <a:pt x="7217862" y="18288"/>
+                </a:cubicBezTo>
+                <a:cubicBezTo>
+                  <a:pt x="6999780" y="9467"/>
+                  <a:pt x="6680409" y="18985"/>
+                  <a:pt x="6539492" y="18288"/>
+                </a:cubicBezTo>
+                <a:cubicBezTo>
+                  <a:pt x="6398575" y="17592"/>
+                  <a:pt x="6312077" y="33018"/>
+                  <a:pt x="6186739" y="18288"/>
+                </a:cubicBezTo>
+                <a:cubicBezTo>
+                  <a:pt x="6061401" y="3558"/>
+                  <a:pt x="5947033" y="12075"/>
+                  <a:pt x="5833986" y="18288"/>
+                </a:cubicBezTo>
+                <a:cubicBezTo>
+                  <a:pt x="5720939" y="24501"/>
+                  <a:pt x="5482226" y="8586"/>
+                  <a:pt x="5155616" y="18288"/>
+                </a:cubicBezTo>
+                <a:cubicBezTo>
+                  <a:pt x="4829006" y="27991"/>
+                  <a:pt x="4841274" y="29316"/>
+                  <a:pt x="4694324" y="18288"/>
+                </a:cubicBezTo>
+                <a:cubicBezTo>
+                  <a:pt x="4547374" y="7260"/>
+                  <a:pt x="4077675" y="7013"/>
+                  <a:pt x="3907414" y="18288"/>
+                </a:cubicBezTo>
+                <a:cubicBezTo>
+                  <a:pt x="3737153" y="29564"/>
+                  <a:pt x="3538393" y="21630"/>
+                  <a:pt x="3446122" y="18288"/>
+                </a:cubicBezTo>
+                <a:cubicBezTo>
+                  <a:pt x="3353851" y="14946"/>
+                  <a:pt x="2990320" y="-8091"/>
+                  <a:pt x="2659212" y="18288"/>
+                </a:cubicBezTo>
+                <a:cubicBezTo>
+                  <a:pt x="2328104" y="44667"/>
+                  <a:pt x="2427653" y="9607"/>
+                  <a:pt x="2306460" y="18288"/>
+                </a:cubicBezTo>
+                <a:cubicBezTo>
+                  <a:pt x="2185267" y="26969"/>
+                  <a:pt x="1719763" y="3717"/>
+                  <a:pt x="1519550" y="18288"/>
+                </a:cubicBezTo>
+                <a:cubicBezTo>
+                  <a:pt x="1319337" y="32860"/>
+                  <a:pt x="1167371" y="17040"/>
+                  <a:pt x="1058258" y="18288"/>
+                </a:cubicBezTo>
+                <a:cubicBezTo>
+                  <a:pt x="949145" y="19536"/>
+                  <a:pt x="780234" y="31447"/>
+                  <a:pt x="705505" y="18288"/>
+                </a:cubicBezTo>
+                <a:cubicBezTo>
+                  <a:pt x="630776" y="5129"/>
+                  <a:pt x="215796" y="30056"/>
+                  <a:pt x="0" y="18288"/>
+                </a:cubicBezTo>
+                <a:cubicBezTo>
+                  <a:pt x="-53" y="11301"/>
+                  <a:pt x="-649" y="7756"/>
+                  <a:pt x="0" y="0"/>
+                </a:cubicBezTo>
+                <a:close/>
+              </a:path>
+            </a:pathLst>
+          </a:custGeom>
+          <a:solidFill>
+            <a:schemeClr val="accent2"/>
+          </a:solidFill>
+          <a:ln w="41275" cap="rnd">
+            <a:solidFill>
+              <a:schemeClr val="accent2"/>
+            </a:solidFill>
+            <a:round/>
+            <a:extLst>
+              <a:ext uri="{C807C97D-BFC1-408E-A445-0C87EB9F89A2}">
+                <ask:lineSketchStyleProps xmlns:ask="http://schemas.microsoft.com/office/drawing/2018/sketchyshapes" sd="1219033472">
+                  <a:prstGeom prst="rect">
+                    <a:avLst/>
+                  </a:prstGeom>
+                  <ask:type>
+                    <ask:lineSketchFreehand/>
+                  </ask:type>
+                </ask:lineSketchStyleProps>
+              </a:ext>
+            </a:extLst>
+          </a:ln>
+        </p:spPr>
+        <p:style>
+          <a:lnRef idx="2">
+            <a:schemeClr val="accent1">
+              <a:shade val="50000"/>
+            </a:schemeClr>
+          </a:lnRef>
+          <a:fillRef idx="1">
+            <a:schemeClr val="accent1"/>
+          </a:fillRef>
+          <a:effectRef idx="0">
+            <a:schemeClr val="accent1"/>
+          </a:effectRef>
+          <a:fontRef idx="minor">
+            <a:schemeClr val="lt1"/>
+          </a:fontRef>
+        </p:style>
+        <p:txBody>
+          <a:bodyPr rtlCol="0" anchor="ctr"/>
+          <a:lstStyle/>
+          <a:p>
+            <a:pPr algn="ctr"/>
+            <a:endParaRPr lang="en-US"/>
+          </a:p>
+        </p:txBody>
+      </p:sp>
+      <p:sp>
+        <p:nvSpPr>
+          <p:cNvPr id="13" name="Segnaposto contenuto 2">
+            <a:extLst>
+              <a:ext uri="{FF2B5EF4-FFF2-40B4-BE49-F238E27FC236}">
+                <a16:creationId xmlns:a16="http://schemas.microsoft.com/office/drawing/2014/main" id="{28F789CB-F006-5669-0545-B5B25CFAACA1}"/>
+              </a:ext>
+            </a:extLst>
+          </p:cNvPr>
+          <p:cNvSpPr>
+            <a:spLocks noGrp="1"/>
+          </p:cNvSpPr>
+          <p:nvPr>
+            <p:ph idx="1"/>
+          </p:nvPr>
+        </p:nvSpPr>
+        <p:spPr>
+          <a:xfrm>
+            <a:off x="836676" y="2367344"/>
+            <a:ext cx="10515600" cy="4125531"/>
+          </a:xfrm>
+        </p:spPr>
+        <p:txBody>
+          <a:bodyPr>
+            <a:normAutofit/>
+          </a:bodyPr>
+          <a:lstStyle/>
+          <a:p>
+            <a:pPr marL="0" indent="0">
+              <a:buNone/>
+            </a:pPr>
+            <a:endParaRPr lang="it-IT" sz="3200" dirty="0">
+              <a:solidFill>
+                <a:srgbClr val="ED7D31"/>
+              </a:solidFill>
+            </a:endParaRPr>
+          </a:p>
+          <a:p>
+            <a:r>
+              <a:rPr lang="it-IT" sz="2200" dirty="0">
+                <a:solidFill>
+                  <a:srgbClr val="0C01D3"/>
+                </a:solidFill>
+              </a:rPr>
+              <a:t>Aggiunta di dettagli e animazioni alle statistiche</a:t>
+            </a:r>
+          </a:p>
+          <a:p>
+            <a:r>
+              <a:rPr lang="it-IT" sz="2200" dirty="0">
+                <a:solidFill>
+                  <a:srgbClr val="0C01D3"/>
+                </a:solidFill>
+              </a:rPr>
+              <a:t>Estensione del software a molti altri tipi di votazioni/elezioni</a:t>
+            </a:r>
+          </a:p>
+          <a:p>
+            <a:r>
+              <a:rPr lang="it-IT" sz="2200" dirty="0">
+                <a:solidFill>
+                  <a:srgbClr val="0C01D3"/>
+                </a:solidFill>
+              </a:rPr>
+              <a:t>Backup minimale</a:t>
+            </a:r>
+          </a:p>
+          <a:p>
+            <a:r>
+              <a:rPr lang="it-IT" sz="2200" dirty="0">
+                <a:solidFill>
+                  <a:srgbClr val="0C01D3"/>
+                </a:solidFill>
+              </a:rPr>
+              <a:t>Incrementare la sicurezza, come lo standard «inserire nome standard»</a:t>
+            </a:r>
+          </a:p>
+          <a:p>
+            <a:r>
+              <a:rPr lang="it-IT" sz="2200" dirty="0">
+                <a:solidFill>
+                  <a:srgbClr val="0C01D3"/>
+                </a:solidFill>
+              </a:rPr>
+              <a:t>Riconoscimento facciale</a:t>
+            </a:r>
+          </a:p>
+        </p:txBody>
+      </p:sp>
+      <p:pic>
+        <p:nvPicPr>
+          <p:cNvPr id="12" name="Immagine 11">
+            <a:extLst>
+              <a:ext uri="{FF2B5EF4-FFF2-40B4-BE49-F238E27FC236}">
+                <a16:creationId xmlns:a16="http://schemas.microsoft.com/office/drawing/2014/main" id="{098590E5-8E74-DD1C-28CE-A64920BB68EA}"/>
+              </a:ext>
+            </a:extLst>
+          </p:cNvPr>
+          <p:cNvPicPr>
+            <a:picLocks noChangeAspect="1"/>
+          </p:cNvPicPr>
+          <p:nvPr/>
+        </p:nvPicPr>
+        <p:blipFill>
+          <a:blip r:embed="rId2">
+            <a:extLst>
+              <a:ext uri="{28A0092B-C50C-407E-A947-70E740481C1C}">
+                <a14:useLocalDpi xmlns:a14="http://schemas.microsoft.com/office/drawing/2010/main" val="0"/>
+              </a:ext>
+            </a:extLst>
+          </a:blip>
+          <a:stretch>
+            <a:fillRect/>
+          </a:stretch>
+        </p:blipFill>
+        <p:spPr>
+          <a:xfrm>
+            <a:off x="11212066" y="271844"/>
+            <a:ext cx="677507" cy="483933"/>
+          </a:xfrm>
+          <a:prstGeom prst="rect">
+            <a:avLst/>
+          </a:prstGeom>
+        </p:spPr>
+      </p:pic>
+    </p:spTree>
+    <p:extLst>
+      <p:ext uri="{BB962C8B-B14F-4D97-AF65-F5344CB8AC3E}">
+        <p14:creationId xmlns:p14="http://schemas.microsoft.com/office/powerpoint/2010/main" val="3827316853"/>
+      </p:ext>
+    </p:extLst>
+  </p:cSld>
+  <p:clrMapOvr>
+    <a:masterClrMapping/>
+  </p:clrMapOvr>
+</p:sld>
+</file>
+
 <file path=ppt/slides/slide2.xml><?xml version="1.0" encoding="utf-8"?>
 <p:sld xmlns:a="http://schemas.openxmlformats.org/drawingml/2006/main" xmlns:r="http://schemas.openxmlformats.org/officeDocument/2006/relationships" xmlns:p="http://schemas.openxmlformats.org/presentationml/2006/main">
   <p:cSld>
@@ -11216,6 +13026,564 @@
 </file>
 
 <file path=ppt/slides/slide6.xml><?xml version="1.0" encoding="utf-8"?>
+<p:sld xmlns:a="http://schemas.openxmlformats.org/drawingml/2006/main" xmlns:r="http://schemas.openxmlformats.org/officeDocument/2006/relationships" xmlns:p="http://schemas.openxmlformats.org/presentationml/2006/main">
+  <p:cSld>
+    <p:bg>
+      <p:bgPr>
+        <a:solidFill>
+          <a:srgbClr val="BBC5D9"/>
+        </a:solidFill>
+        <a:effectLst/>
+      </p:bgPr>
+    </p:bg>
+    <p:spTree>
+      <p:nvGrpSpPr>
+        <p:cNvPr id="1" name=""/>
+        <p:cNvGrpSpPr/>
+        <p:nvPr/>
+      </p:nvGrpSpPr>
+      <p:grpSpPr>
+        <a:xfrm>
+          <a:off x="0" y="0"/>
+          <a:ext cx="0" cy="0"/>
+          <a:chOff x="0" y="0"/>
+          <a:chExt cx="0" cy="0"/>
+        </a:xfrm>
+      </p:grpSpPr>
+      <p:sp useBgFill="1">
+        <p:nvSpPr>
+          <p:cNvPr id="10" name="Rectangle 9">
+            <a:extLst>
+              <a:ext uri="{FF2B5EF4-FFF2-40B4-BE49-F238E27FC236}">
+                <a16:creationId xmlns:a16="http://schemas.microsoft.com/office/drawing/2014/main" id="{BCED4D40-4B67-4331-AC48-79B82B4A47D8}"/>
+              </a:ext>
+              <a:ext uri="{C183D7F6-B498-43B3-948B-1728B52AA6E4}">
+                <adec:decorative xmlns:adec="http://schemas.microsoft.com/office/drawing/2017/decorative" val="1"/>
+              </a:ext>
+            </a:extLst>
+          </p:cNvPr>
+          <p:cNvSpPr>
+            <a:spLocks noGrp="1" noRot="1" noChangeAspect="1" noMove="1" noResize="1" noEditPoints="1" noAdjustHandles="1" noChangeArrowheads="1" noChangeShapeType="1" noTextEdit="1"/>
+          </p:cNvSpPr>
+          <p:nvPr>
+            <p:extLst>
+              <p:ext uri="{386F3935-93C4-4BCD-93E2-E3B085C9AB24}">
+                <p16:designElem xmlns:p16="http://schemas.microsoft.com/office/powerpoint/2015/main" val="1"/>
+              </p:ext>
+            </p:extLst>
+          </p:nvPr>
+        </p:nvSpPr>
+        <p:spPr>
+          <a:xfrm>
+            <a:off x="0" y="0"/>
+            <a:ext cx="12192000" cy="6858000"/>
+          </a:xfrm>
+          <a:prstGeom prst="rect">
+            <a:avLst/>
+          </a:prstGeom>
+          <a:ln>
+            <a:noFill/>
+          </a:ln>
+        </p:spPr>
+        <p:style>
+          <a:lnRef idx="2">
+            <a:schemeClr val="accent1">
+              <a:shade val="50000"/>
+            </a:schemeClr>
+          </a:lnRef>
+          <a:fillRef idx="1">
+            <a:schemeClr val="accent1"/>
+          </a:fillRef>
+          <a:effectRef idx="0">
+            <a:schemeClr val="accent1"/>
+          </a:effectRef>
+          <a:fontRef idx="minor">
+            <a:schemeClr val="lt1"/>
+          </a:fontRef>
+        </p:style>
+        <p:txBody>
+          <a:bodyPr rtlCol="0" anchor="ctr"/>
+          <a:lstStyle/>
+          <a:p>
+            <a:pPr algn="ctr"/>
+            <a:endParaRPr lang="en-US"/>
+          </a:p>
+        </p:txBody>
+      </p:sp>
+      <p:sp>
+        <p:nvSpPr>
+          <p:cNvPr id="2" name="Titolo 1">
+            <a:extLst>
+              <a:ext uri="{FF2B5EF4-FFF2-40B4-BE49-F238E27FC236}">
+                <a16:creationId xmlns:a16="http://schemas.microsoft.com/office/drawing/2014/main" id="{FF4CBE3B-FA9F-5968-2F5F-7198ED9D8053}"/>
+              </a:ext>
+            </a:extLst>
+          </p:cNvPr>
+          <p:cNvSpPr>
+            <a:spLocks noGrp="1"/>
+          </p:cNvSpPr>
+          <p:nvPr>
+            <p:ph type="title"/>
+          </p:nvPr>
+        </p:nvSpPr>
+        <p:spPr>
+          <a:xfrm>
+            <a:off x="638881" y="417576"/>
+            <a:ext cx="10909640" cy="1249394"/>
+          </a:xfrm>
+        </p:spPr>
+        <p:txBody>
+          <a:bodyPr vert="horz" lIns="91440" tIns="45720" rIns="91440" bIns="45720" rtlCol="0" anchor="ctr">
+            <a:normAutofit/>
+          </a:bodyPr>
+          <a:lstStyle/>
+          <a:p>
+            <a:pPr algn="ctr"/>
+            <a:r>
+              <a:rPr lang="en-US" sz="6600" kern="1200" dirty="0" err="1">
+                <a:solidFill>
+                  <a:srgbClr val="ED7D31"/>
+                </a:solidFill>
+                <a:latin typeface="+mj-lt"/>
+                <a:ea typeface="+mj-ea"/>
+                <a:cs typeface="+mj-cs"/>
+              </a:rPr>
+              <a:t>Persistenza</a:t>
+            </a:r>
+            <a:endParaRPr lang="en-US" sz="6600" kern="1200" dirty="0">
+              <a:solidFill>
+                <a:srgbClr val="ED7D31"/>
+              </a:solidFill>
+              <a:latin typeface="+mj-lt"/>
+              <a:ea typeface="+mj-ea"/>
+              <a:cs typeface="+mj-cs"/>
+            </a:endParaRPr>
+          </a:p>
+        </p:txBody>
+      </p:sp>
+      <p:sp>
+        <p:nvSpPr>
+          <p:cNvPr id="12" name="sketch line">
+            <a:extLst>
+              <a:ext uri="{FF2B5EF4-FFF2-40B4-BE49-F238E27FC236}">
+                <a16:creationId xmlns:a16="http://schemas.microsoft.com/office/drawing/2014/main" id="{670CEDEF-4F34-412E-84EE-329C1E936AF5}"/>
+              </a:ext>
+              <a:ext uri="{C183D7F6-B498-43B3-948B-1728B52AA6E4}">
+                <adec:decorative xmlns:adec="http://schemas.microsoft.com/office/drawing/2017/decorative" val="1"/>
+              </a:ext>
+            </a:extLst>
+          </p:cNvPr>
+          <p:cNvSpPr>
+            <a:spLocks noGrp="1" noRot="1" noChangeAspect="1" noMove="1" noResize="1" noEditPoints="1" noAdjustHandles="1" noChangeArrowheads="1" noChangeShapeType="1" noTextEdit="1"/>
+          </p:cNvSpPr>
+          <p:nvPr>
+            <p:extLst>
+              <p:ext uri="{386F3935-93C4-4BCD-93E2-E3B085C9AB24}">
+                <p16:designElem xmlns:p16="http://schemas.microsoft.com/office/powerpoint/2015/main" val="1"/>
+              </p:ext>
+            </p:extLst>
+          </p:nvPr>
+        </p:nvSpPr>
+        <p:spPr>
+          <a:xfrm>
+            <a:off x="3807702" y="1733454"/>
+            <a:ext cx="4572000" cy="18288"/>
+          </a:xfrm>
+          <a:custGeom>
+            <a:avLst/>
+            <a:gdLst>
+              <a:gd name="connsiteX0" fmla="*/ 0 w 4572000"/>
+              <a:gd name="connsiteY0" fmla="*/ 0 h 18288"/>
+              <a:gd name="connsiteX1" fmla="*/ 515983 w 4572000"/>
+              <a:gd name="connsiteY1" fmla="*/ 0 h 18288"/>
+              <a:gd name="connsiteX2" fmla="*/ 1031966 w 4572000"/>
+              <a:gd name="connsiteY2" fmla="*/ 0 h 18288"/>
+              <a:gd name="connsiteX3" fmla="*/ 1639389 w 4572000"/>
+              <a:gd name="connsiteY3" fmla="*/ 0 h 18288"/>
+              <a:gd name="connsiteX4" fmla="*/ 2383971 w 4572000"/>
+              <a:gd name="connsiteY4" fmla="*/ 0 h 18288"/>
+              <a:gd name="connsiteX5" fmla="*/ 2945674 w 4572000"/>
+              <a:gd name="connsiteY5" fmla="*/ 0 h 18288"/>
+              <a:gd name="connsiteX6" fmla="*/ 3507377 w 4572000"/>
+              <a:gd name="connsiteY6" fmla="*/ 0 h 18288"/>
+              <a:gd name="connsiteX7" fmla="*/ 4572000 w 4572000"/>
+              <a:gd name="connsiteY7" fmla="*/ 0 h 18288"/>
+              <a:gd name="connsiteX8" fmla="*/ 4572000 w 4572000"/>
+              <a:gd name="connsiteY8" fmla="*/ 18288 h 18288"/>
+              <a:gd name="connsiteX9" fmla="*/ 3873137 w 4572000"/>
+              <a:gd name="connsiteY9" fmla="*/ 18288 h 18288"/>
+              <a:gd name="connsiteX10" fmla="*/ 3311434 w 4572000"/>
+              <a:gd name="connsiteY10" fmla="*/ 18288 h 18288"/>
+              <a:gd name="connsiteX11" fmla="*/ 2749731 w 4572000"/>
+              <a:gd name="connsiteY11" fmla="*/ 18288 h 18288"/>
+              <a:gd name="connsiteX12" fmla="*/ 2050869 w 4572000"/>
+              <a:gd name="connsiteY12" fmla="*/ 18288 h 18288"/>
+              <a:gd name="connsiteX13" fmla="*/ 1306286 w 4572000"/>
+              <a:gd name="connsiteY13" fmla="*/ 18288 h 18288"/>
+              <a:gd name="connsiteX14" fmla="*/ 790303 w 4572000"/>
+              <a:gd name="connsiteY14" fmla="*/ 18288 h 18288"/>
+              <a:gd name="connsiteX15" fmla="*/ 0 w 4572000"/>
+              <a:gd name="connsiteY15" fmla="*/ 18288 h 18288"/>
+              <a:gd name="connsiteX16" fmla="*/ 0 w 4572000"/>
+              <a:gd name="connsiteY16" fmla="*/ 0 h 18288"/>
+            </a:gdLst>
+            <a:ahLst/>
+            <a:cxnLst>
+              <a:cxn ang="0">
+                <a:pos x="connsiteX0" y="connsiteY0"/>
+              </a:cxn>
+              <a:cxn ang="0">
+                <a:pos x="connsiteX1" y="connsiteY1"/>
+              </a:cxn>
+              <a:cxn ang="0">
+                <a:pos x="connsiteX2" y="connsiteY2"/>
+              </a:cxn>
+              <a:cxn ang="0">
+                <a:pos x="connsiteX3" y="connsiteY3"/>
+              </a:cxn>
+              <a:cxn ang="0">
+                <a:pos x="connsiteX4" y="connsiteY4"/>
+              </a:cxn>
+              <a:cxn ang="0">
+                <a:pos x="connsiteX5" y="connsiteY5"/>
+              </a:cxn>
+              <a:cxn ang="0">
+                <a:pos x="connsiteX6" y="connsiteY6"/>
+              </a:cxn>
+              <a:cxn ang="0">
+                <a:pos x="connsiteX7" y="connsiteY7"/>
+              </a:cxn>
+              <a:cxn ang="0">
+                <a:pos x="connsiteX8" y="connsiteY8"/>
+              </a:cxn>
+              <a:cxn ang="0">
+                <a:pos x="connsiteX9" y="connsiteY9"/>
+              </a:cxn>
+              <a:cxn ang="0">
+                <a:pos x="connsiteX10" y="connsiteY10"/>
+              </a:cxn>
+              <a:cxn ang="0">
+                <a:pos x="connsiteX11" y="connsiteY11"/>
+              </a:cxn>
+              <a:cxn ang="0">
+                <a:pos x="connsiteX12" y="connsiteY12"/>
+              </a:cxn>
+              <a:cxn ang="0">
+                <a:pos x="connsiteX13" y="connsiteY13"/>
+              </a:cxn>
+              <a:cxn ang="0">
+                <a:pos x="connsiteX14" y="connsiteY14"/>
+              </a:cxn>
+              <a:cxn ang="0">
+                <a:pos x="connsiteX15" y="connsiteY15"/>
+              </a:cxn>
+              <a:cxn ang="0">
+                <a:pos x="connsiteX16" y="connsiteY16"/>
+              </a:cxn>
+            </a:cxnLst>
+            <a:rect l="l" t="t" r="r" b="b"/>
+            <a:pathLst>
+              <a:path w="4572000" h="18288" fill="none" extrusionOk="0">
+                <a:moveTo>
+                  <a:pt x="0" y="0"/>
+                </a:moveTo>
+                <a:cubicBezTo>
+                  <a:pt x="105156" y="-20963"/>
+                  <a:pt x="340432" y="822"/>
+                  <a:pt x="515983" y="0"/>
+                </a:cubicBezTo>
+                <a:cubicBezTo>
+                  <a:pt x="691534" y="-822"/>
+                  <a:pt x="850679" y="16479"/>
+                  <a:pt x="1031966" y="0"/>
+                </a:cubicBezTo>
+                <a:cubicBezTo>
+                  <a:pt x="1213253" y="-16479"/>
+                  <a:pt x="1443646" y="-18730"/>
+                  <a:pt x="1639389" y="0"/>
+                </a:cubicBezTo>
+                <a:cubicBezTo>
+                  <a:pt x="1835132" y="18730"/>
+                  <a:pt x="2159975" y="18531"/>
+                  <a:pt x="2383971" y="0"/>
+                </a:cubicBezTo>
+                <a:cubicBezTo>
+                  <a:pt x="2607967" y="-18531"/>
+                  <a:pt x="2719096" y="-12030"/>
+                  <a:pt x="2945674" y="0"/>
+                </a:cubicBezTo>
+                <a:cubicBezTo>
+                  <a:pt x="3172252" y="12030"/>
+                  <a:pt x="3269167" y="27666"/>
+                  <a:pt x="3507377" y="0"/>
+                </a:cubicBezTo>
+                <a:cubicBezTo>
+                  <a:pt x="3745587" y="-27666"/>
+                  <a:pt x="4116741" y="18705"/>
+                  <a:pt x="4572000" y="0"/>
+                </a:cubicBezTo>
+                <a:cubicBezTo>
+                  <a:pt x="4572895" y="8974"/>
+                  <a:pt x="4571454" y="9359"/>
+                  <a:pt x="4572000" y="18288"/>
+                </a:cubicBezTo>
+                <a:cubicBezTo>
+                  <a:pt x="4374698" y="3942"/>
+                  <a:pt x="4098874" y="-11042"/>
+                  <a:pt x="3873137" y="18288"/>
+                </a:cubicBezTo>
+                <a:cubicBezTo>
+                  <a:pt x="3647400" y="47618"/>
+                  <a:pt x="3517055" y="5421"/>
+                  <a:pt x="3311434" y="18288"/>
+                </a:cubicBezTo>
+                <a:cubicBezTo>
+                  <a:pt x="3105813" y="31155"/>
+                  <a:pt x="3025168" y="17856"/>
+                  <a:pt x="2749731" y="18288"/>
+                </a:cubicBezTo>
+                <a:cubicBezTo>
+                  <a:pt x="2474294" y="18720"/>
+                  <a:pt x="2291766" y="-14168"/>
+                  <a:pt x="2050869" y="18288"/>
+                </a:cubicBezTo>
+                <a:cubicBezTo>
+                  <a:pt x="1809972" y="50744"/>
+                  <a:pt x="1540276" y="46798"/>
+                  <a:pt x="1306286" y="18288"/>
+                </a:cubicBezTo>
+                <a:cubicBezTo>
+                  <a:pt x="1072296" y="-10222"/>
+                  <a:pt x="972445" y="19645"/>
+                  <a:pt x="790303" y="18288"/>
+                </a:cubicBezTo>
+                <a:cubicBezTo>
+                  <a:pt x="608161" y="16931"/>
+                  <a:pt x="200981" y="8241"/>
+                  <a:pt x="0" y="18288"/>
+                </a:cubicBezTo>
+                <a:cubicBezTo>
+                  <a:pt x="-229" y="14222"/>
+                  <a:pt x="509" y="5816"/>
+                  <a:pt x="0" y="0"/>
+                </a:cubicBezTo>
+                <a:close/>
+              </a:path>
+              <a:path w="4572000" h="18288" stroke="0" extrusionOk="0">
+                <a:moveTo>
+                  <a:pt x="0" y="0"/>
+                </a:moveTo>
+                <a:cubicBezTo>
+                  <a:pt x="143285" y="-9565"/>
+                  <a:pt x="327959" y="-11498"/>
+                  <a:pt x="561703" y="0"/>
+                </a:cubicBezTo>
+                <a:cubicBezTo>
+                  <a:pt x="795447" y="11498"/>
+                  <a:pt x="838260" y="18255"/>
+                  <a:pt x="1077686" y="0"/>
+                </a:cubicBezTo>
+                <a:cubicBezTo>
+                  <a:pt x="1317112" y="-18255"/>
+                  <a:pt x="1437472" y="23514"/>
+                  <a:pt x="1639389" y="0"/>
+                </a:cubicBezTo>
+                <a:cubicBezTo>
+                  <a:pt x="1841306" y="-23514"/>
+                  <a:pt x="2037142" y="-12551"/>
+                  <a:pt x="2292531" y="0"/>
+                </a:cubicBezTo>
+                <a:cubicBezTo>
+                  <a:pt x="2547920" y="12551"/>
+                  <a:pt x="2810436" y="-20352"/>
+                  <a:pt x="2991394" y="0"/>
+                </a:cubicBezTo>
+                <a:cubicBezTo>
+                  <a:pt x="3172352" y="20352"/>
+                  <a:pt x="3530025" y="-13347"/>
+                  <a:pt x="3735977" y="0"/>
+                </a:cubicBezTo>
+                <a:cubicBezTo>
+                  <a:pt x="3941929" y="13347"/>
+                  <a:pt x="4161497" y="34086"/>
+                  <a:pt x="4572000" y="0"/>
+                </a:cubicBezTo>
+                <a:cubicBezTo>
+                  <a:pt x="4571545" y="6162"/>
+                  <a:pt x="4571903" y="11775"/>
+                  <a:pt x="4572000" y="18288"/>
+                </a:cubicBezTo>
+                <a:cubicBezTo>
+                  <a:pt x="4228040" y="36490"/>
+                  <a:pt x="4199736" y="42557"/>
+                  <a:pt x="3873137" y="18288"/>
+                </a:cubicBezTo>
+                <a:cubicBezTo>
+                  <a:pt x="3546538" y="-5981"/>
+                  <a:pt x="3472124" y="16809"/>
+                  <a:pt x="3128554" y="18288"/>
+                </a:cubicBezTo>
+                <a:cubicBezTo>
+                  <a:pt x="2784984" y="19767"/>
+                  <a:pt x="2735896" y="-17781"/>
+                  <a:pt x="2383971" y="18288"/>
+                </a:cubicBezTo>
+                <a:cubicBezTo>
+                  <a:pt x="2032046" y="54357"/>
+                  <a:pt x="2019324" y="2920"/>
+                  <a:pt x="1867989" y="18288"/>
+                </a:cubicBezTo>
+                <a:cubicBezTo>
+                  <a:pt x="1716654" y="33656"/>
+                  <a:pt x="1418675" y="32575"/>
+                  <a:pt x="1169126" y="18288"/>
+                </a:cubicBezTo>
+                <a:cubicBezTo>
+                  <a:pt x="919577" y="4001"/>
+                  <a:pt x="798537" y="16165"/>
+                  <a:pt x="561703" y="18288"/>
+                </a:cubicBezTo>
+                <a:cubicBezTo>
+                  <a:pt x="324869" y="20411"/>
+                  <a:pt x="221395" y="-912"/>
+                  <a:pt x="0" y="18288"/>
+                </a:cubicBezTo>
+                <a:cubicBezTo>
+                  <a:pt x="766" y="10800"/>
+                  <a:pt x="-457" y="8180"/>
+                  <a:pt x="0" y="0"/>
+                </a:cubicBezTo>
+                <a:close/>
+              </a:path>
+            </a:pathLst>
+          </a:custGeom>
+          <a:solidFill>
+            <a:schemeClr val="accent2"/>
+          </a:solidFill>
+          <a:ln w="41275" cap="rnd">
+            <a:solidFill>
+              <a:schemeClr val="accent2"/>
+            </a:solidFill>
+            <a:round/>
+            <a:extLst>
+              <a:ext uri="{C807C97D-BFC1-408E-A445-0C87EB9F89A2}">
+                <ask:lineSketchStyleProps xmlns:ask="http://schemas.microsoft.com/office/drawing/2018/sketchyshapes" sd="2727557108">
+                  <a:prstGeom prst="rect">
+                    <a:avLst/>
+                  </a:prstGeom>
+                  <ask:type>
+                    <ask:lineSketchFreehand/>
+                  </ask:type>
+                </ask:lineSketchStyleProps>
+              </a:ext>
+            </a:extLst>
+          </a:ln>
+        </p:spPr>
+        <p:style>
+          <a:lnRef idx="2">
+            <a:schemeClr val="accent1">
+              <a:shade val="50000"/>
+            </a:schemeClr>
+          </a:lnRef>
+          <a:fillRef idx="1">
+            <a:schemeClr val="accent1"/>
+          </a:fillRef>
+          <a:effectRef idx="0">
+            <a:schemeClr val="accent1"/>
+          </a:effectRef>
+          <a:fontRef idx="minor">
+            <a:schemeClr val="lt1"/>
+          </a:fontRef>
+        </p:style>
+        <p:txBody>
+          <a:bodyPr rtlCol="0" anchor="ctr"/>
+          <a:lstStyle/>
+          <a:p>
+            <a:pPr algn="ctr"/>
+            <a:endParaRPr lang="en-US"/>
+          </a:p>
+        </p:txBody>
+      </p:sp>
+      <p:pic>
+        <p:nvPicPr>
+          <p:cNvPr id="5" name="Immagine 4">
+            <a:extLst>
+              <a:ext uri="{FF2B5EF4-FFF2-40B4-BE49-F238E27FC236}">
+                <a16:creationId xmlns:a16="http://schemas.microsoft.com/office/drawing/2014/main" id="{6AFF0ABF-BA2E-447E-89FE-BF80B4BB299F}"/>
+              </a:ext>
+            </a:extLst>
+          </p:cNvPr>
+          <p:cNvPicPr>
+            <a:picLocks noChangeAspect="1"/>
+          </p:cNvPicPr>
+          <p:nvPr/>
+        </p:nvPicPr>
+        <p:blipFill>
+          <a:blip r:embed="rId2"/>
+          <a:stretch>
+            <a:fillRect/>
+          </a:stretch>
+        </p:blipFill>
+        <p:spPr>
+          <a:xfrm>
+            <a:off x="2252815" y="1961931"/>
+            <a:ext cx="7681771" cy="4685880"/>
+          </a:xfrm>
+          <a:prstGeom prst="rect">
+            <a:avLst/>
+          </a:prstGeom>
+        </p:spPr>
+      </p:pic>
+      <p:pic>
+        <p:nvPicPr>
+          <p:cNvPr id="6" name="Immagine 5">
+            <a:extLst>
+              <a:ext uri="{FF2B5EF4-FFF2-40B4-BE49-F238E27FC236}">
+                <a16:creationId xmlns:a16="http://schemas.microsoft.com/office/drawing/2014/main" id="{F4AE02CA-BC64-661F-9A00-66C02A3F2AEF}"/>
+              </a:ext>
+            </a:extLst>
+          </p:cNvPr>
+          <p:cNvPicPr>
+            <a:picLocks noChangeAspect="1"/>
+          </p:cNvPicPr>
+          <p:nvPr/>
+        </p:nvPicPr>
+        <p:blipFill>
+          <a:blip r:embed="rId3">
+            <a:extLst>
+              <a:ext uri="{28A0092B-C50C-407E-A947-70E740481C1C}">
+                <a14:useLocalDpi xmlns:a14="http://schemas.microsoft.com/office/drawing/2010/main" val="0"/>
+              </a:ext>
+            </a:extLst>
+          </a:blip>
+          <a:stretch>
+            <a:fillRect/>
+          </a:stretch>
+        </p:blipFill>
+        <p:spPr>
+          <a:xfrm>
+            <a:off x="11212066" y="271844"/>
+            <a:ext cx="677507" cy="483933"/>
+          </a:xfrm>
+          <a:prstGeom prst="rect">
+            <a:avLst/>
+          </a:prstGeom>
+        </p:spPr>
+      </p:pic>
+    </p:spTree>
+    <p:extLst>
+      <p:ext uri="{BB962C8B-B14F-4D97-AF65-F5344CB8AC3E}">
+        <p14:creationId xmlns:p14="http://schemas.microsoft.com/office/powerpoint/2010/main" val="881728199"/>
+      </p:ext>
+    </p:extLst>
+  </p:cSld>
+  <p:clrMapOvr>
+    <a:masterClrMapping/>
+  </p:clrMapOvr>
+</p:sld>
+</file>
+
+<file path=ppt/slides/slide7.xml><?xml version="1.0" encoding="utf-8"?>
 <p:sld xmlns:a="http://schemas.openxmlformats.org/drawingml/2006/main" xmlns:r="http://schemas.openxmlformats.org/officeDocument/2006/relationships" xmlns:p="http://schemas.openxmlformats.org/presentationml/2006/main">
   <p:cSld>
     <p:bg>
@@ -12293,7 +14661,7 @@
 </p:sld>
 </file>
 
-<file path=ppt/slides/slide7.xml><?xml version="1.0" encoding="utf-8"?>
+<file path=ppt/slides/slide8.xml><?xml version="1.0" encoding="utf-8"?>
 <p:sld xmlns:a="http://schemas.openxmlformats.org/drawingml/2006/main" xmlns:r="http://schemas.openxmlformats.org/officeDocument/2006/relationships" xmlns:p="http://schemas.openxmlformats.org/presentationml/2006/main">
   <p:cSld>
     <p:bg>
@@ -13087,7 +15455,7 @@
             <p:ph idx="1"/>
             <p:extLst>
               <p:ext uri="{D42A27DB-BD31-4B8C-83A1-F6EECF244321}">
-                <p14:modId xmlns:p14="http://schemas.microsoft.com/office/powerpoint/2010/main" val="1474363790"/>
+                <p14:modId xmlns:p14="http://schemas.microsoft.com/office/powerpoint/2010/main" val="2114525476"/>
               </p:ext>
             </p:extLst>
           </p:nvPr>
@@ -13106,6 +15474,189 @@
     <p:extLst>
       <p:ext uri="{BB962C8B-B14F-4D97-AF65-F5344CB8AC3E}">
         <p14:creationId xmlns:p14="http://schemas.microsoft.com/office/powerpoint/2010/main" val="3696296283"/>
+      </p:ext>
+    </p:extLst>
+  </p:cSld>
+  <p:clrMapOvr>
+    <a:masterClrMapping/>
+  </p:clrMapOvr>
+</p:sld>
+</file>
+
+<file path=ppt/slides/slide9.xml><?xml version="1.0" encoding="utf-8"?>
+<p:sld xmlns:a="http://schemas.openxmlformats.org/drawingml/2006/main" xmlns:r="http://schemas.openxmlformats.org/officeDocument/2006/relationships" xmlns:p="http://schemas.openxmlformats.org/presentationml/2006/main">
+  <p:cSld>
+    <p:bg>
+      <p:bgPr>
+        <a:solidFill>
+          <a:schemeClr val="bg1"/>
+        </a:solidFill>
+        <a:effectLst/>
+      </p:bgPr>
+    </p:bg>
+    <p:spTree>
+      <p:nvGrpSpPr>
+        <p:cNvPr id="1" name=""/>
+        <p:cNvGrpSpPr/>
+        <p:nvPr/>
+      </p:nvGrpSpPr>
+      <p:grpSpPr>
+        <a:xfrm>
+          <a:off x="0" y="0"/>
+          <a:ext cx="0" cy="0"/>
+          <a:chOff x="0" y="0"/>
+          <a:chExt cx="0" cy="0"/>
+        </a:xfrm>
+      </p:grpSpPr>
+      <p:sp>
+        <p:nvSpPr>
+          <p:cNvPr id="2" name="Titolo 1">
+            <a:extLst>
+              <a:ext uri="{FF2B5EF4-FFF2-40B4-BE49-F238E27FC236}">
+                <a16:creationId xmlns:a16="http://schemas.microsoft.com/office/drawing/2014/main" id="{6B8A2198-CDA4-5830-5E6F-7A30E089704F}"/>
+              </a:ext>
+            </a:extLst>
+          </p:cNvPr>
+          <p:cNvSpPr>
+            <a:spLocks noGrp="1"/>
+          </p:cNvSpPr>
+          <p:nvPr>
+            <p:ph type="title"/>
+          </p:nvPr>
+        </p:nvSpPr>
+        <p:spPr>
+          <a:xfrm>
+            <a:off x="293826" y="3828350"/>
+            <a:ext cx="11604347" cy="2452687"/>
+          </a:xfrm>
+        </p:spPr>
+        <p:txBody>
+          <a:bodyPr anchor="ctr">
+            <a:normAutofit/>
+          </a:bodyPr>
+          <a:lstStyle/>
+          <a:p>
+            <a:pPr algn="ctr"/>
+            <a:r>
+              <a:rPr lang="it-IT" sz="3600" dirty="0">
+                <a:solidFill>
+                  <a:srgbClr val="ED7D31"/>
+                </a:solidFill>
+              </a:rPr>
+              <a:t>Dal login…</a:t>
+            </a:r>
+            <a:endParaRPr lang="en-GB" sz="3600" dirty="0">
+              <a:solidFill>
+                <a:srgbClr val="ED7D31"/>
+              </a:solidFill>
+            </a:endParaRPr>
+          </a:p>
+        </p:txBody>
+      </p:sp>
+      <p:pic>
+        <p:nvPicPr>
+          <p:cNvPr id="5" name="Segnaposto contenuto 4">
+            <a:extLst>
+              <a:ext uri="{FF2B5EF4-FFF2-40B4-BE49-F238E27FC236}">
+                <a16:creationId xmlns:a16="http://schemas.microsoft.com/office/drawing/2014/main" id="{9D1A7772-DDAF-AEDB-CAC2-938D293B1155}"/>
+              </a:ext>
+            </a:extLst>
+          </p:cNvPr>
+          <p:cNvPicPr>
+            <a:picLocks noChangeAspect="1"/>
+          </p:cNvPicPr>
+          <p:nvPr/>
+        </p:nvPicPr>
+        <p:blipFill rotWithShape="1">
+          <a:blip r:embed="rId2">
+            <a:extLst>
+              <a:ext uri="{28A0092B-C50C-407E-A947-70E740481C1C}">
+                <a14:useLocalDpi xmlns:a14="http://schemas.microsoft.com/office/drawing/2010/main" val="0"/>
+              </a:ext>
+            </a:extLst>
+          </a:blip>
+          <a:srcRect t="32822" b="13072"/>
+          <a:stretch/>
+        </p:blipFill>
+        <p:spPr>
+          <a:xfrm>
+            <a:off x="20" y="10"/>
+            <a:ext cx="12191980" cy="3710603"/>
+          </a:xfrm>
+          <a:custGeom>
+            <a:avLst/>
+            <a:gdLst/>
+            <a:ahLst/>
+            <a:cxnLst/>
+            <a:rect l="l" t="t" r="r" b="b"/>
+            <a:pathLst>
+              <a:path w="12192000" h="3692092">
+                <a:moveTo>
+                  <a:pt x="0" y="0"/>
+                </a:moveTo>
+                <a:lnTo>
+                  <a:pt x="12192000" y="0"/>
+                </a:lnTo>
+                <a:lnTo>
+                  <a:pt x="12192000" y="3504824"/>
+                </a:lnTo>
+                <a:lnTo>
+                  <a:pt x="12024691" y="3517794"/>
+                </a:lnTo>
+                <a:cubicBezTo>
+                  <a:pt x="8077523" y="3783195"/>
+                  <a:pt x="4094678" y="3026959"/>
+                  <a:pt x="160485" y="3663863"/>
+                </a:cubicBezTo>
+                <a:lnTo>
+                  <a:pt x="0" y="3692092"/>
+                </a:lnTo>
+                <a:close/>
+              </a:path>
+            </a:pathLst>
+          </a:custGeom>
+        </p:spPr>
+      </p:pic>
+      <p:pic>
+        <p:nvPicPr>
+          <p:cNvPr id="11" name="Immagine 10">
+            <a:extLst>
+              <a:ext uri="{FF2B5EF4-FFF2-40B4-BE49-F238E27FC236}">
+                <a16:creationId xmlns:a16="http://schemas.microsoft.com/office/drawing/2014/main" id="{B4CC8760-665A-699A-D5A1-83952FE5A893}"/>
+              </a:ext>
+            </a:extLst>
+          </p:cNvPr>
+          <p:cNvPicPr>
+            <a:picLocks noChangeAspect="1"/>
+          </p:cNvPicPr>
+          <p:nvPr/>
+        </p:nvPicPr>
+        <p:blipFill>
+          <a:blip r:embed="rId3">
+            <a:extLst>
+              <a:ext uri="{28A0092B-C50C-407E-A947-70E740481C1C}">
+                <a14:useLocalDpi xmlns:a14="http://schemas.microsoft.com/office/drawing/2010/main" val="0"/>
+              </a:ext>
+            </a:extLst>
+          </a:blip>
+          <a:stretch>
+            <a:fillRect/>
+          </a:stretch>
+        </p:blipFill>
+        <p:spPr>
+          <a:xfrm>
+            <a:off x="11212066" y="271844"/>
+            <a:ext cx="677507" cy="483933"/>
+          </a:xfrm>
+          <a:prstGeom prst="rect">
+            <a:avLst/>
+          </a:prstGeom>
+        </p:spPr>
+      </p:pic>
+    </p:spTree>
+    <p:extLst>
+      <p:ext uri="{BB962C8B-B14F-4D97-AF65-F5344CB8AC3E}">
+        <p14:creationId xmlns:p14="http://schemas.microsoft.com/office/powerpoint/2010/main" val="3459565490"/>
       </p:ext>
     </p:extLst>
   </p:cSld>

</xml_diff>